<commit_message>
cheem tours variant 1 & 2 sketch.
</commit_message>
<xml_diff>
--- a/zDesignDrafts/Trees_of_Cheem_pitch.pptx
+++ b/zDesignDrafts/Trees_of_Cheem_pitch.pptx
@@ -211,7 +211,7 @@
           <a:p>
             <a:fld id="{C72F94A2-838B-4759-A66F-F5175F9F634D}" type="datetimeFigureOut">
               <a:rPr lang="en-US" smtClean="0"/>
-              <a:t>19-Mar-21</a:t>
+              <a:t>28-Mar-21</a:t>
             </a:fld>
             <a:endParaRPr lang="en-US"/>
           </a:p>
@@ -625,7 +625,7 @@
           <a:p>
             <a:fld id="{DF9E133C-D775-44AC-B629-43372F2DE94E}" type="datetimeFigureOut">
               <a:rPr lang="en-US" smtClean="0"/>
-              <a:t>19-Mar-21</a:t>
+              <a:t>28-Mar-21</a:t>
             </a:fld>
             <a:endParaRPr lang="en-US"/>
           </a:p>
@@ -823,7 +823,7 @@
           <a:p>
             <a:fld id="{DF9E133C-D775-44AC-B629-43372F2DE94E}" type="datetimeFigureOut">
               <a:rPr lang="en-US" smtClean="0"/>
-              <a:t>19-Mar-21</a:t>
+              <a:t>28-Mar-21</a:t>
             </a:fld>
             <a:endParaRPr lang="en-US"/>
           </a:p>
@@ -1031,7 +1031,7 @@
           <a:p>
             <a:fld id="{DF9E133C-D775-44AC-B629-43372F2DE94E}" type="datetimeFigureOut">
               <a:rPr lang="en-US" smtClean="0"/>
-              <a:t>19-Mar-21</a:t>
+              <a:t>28-Mar-21</a:t>
             </a:fld>
             <a:endParaRPr lang="en-US"/>
           </a:p>
@@ -1229,7 +1229,7 @@
           <a:p>
             <a:fld id="{DF9E133C-D775-44AC-B629-43372F2DE94E}" type="datetimeFigureOut">
               <a:rPr lang="en-US" smtClean="0"/>
-              <a:t>19-Mar-21</a:t>
+              <a:t>28-Mar-21</a:t>
             </a:fld>
             <a:endParaRPr lang="en-US"/>
           </a:p>
@@ -1504,7 +1504,7 @@
           <a:p>
             <a:fld id="{DF9E133C-D775-44AC-B629-43372F2DE94E}" type="datetimeFigureOut">
               <a:rPr lang="en-US" smtClean="0"/>
-              <a:t>19-Mar-21</a:t>
+              <a:t>28-Mar-21</a:t>
             </a:fld>
             <a:endParaRPr lang="en-US"/>
           </a:p>
@@ -1769,7 +1769,7 @@
           <a:p>
             <a:fld id="{DF9E133C-D775-44AC-B629-43372F2DE94E}" type="datetimeFigureOut">
               <a:rPr lang="en-US" smtClean="0"/>
-              <a:t>19-Mar-21</a:t>
+              <a:t>28-Mar-21</a:t>
             </a:fld>
             <a:endParaRPr lang="en-US"/>
           </a:p>
@@ -2181,7 +2181,7 @@
           <a:p>
             <a:fld id="{DF9E133C-D775-44AC-B629-43372F2DE94E}" type="datetimeFigureOut">
               <a:rPr lang="en-US" smtClean="0"/>
-              <a:t>19-Mar-21</a:t>
+              <a:t>28-Mar-21</a:t>
             </a:fld>
             <a:endParaRPr lang="en-US"/>
           </a:p>
@@ -2322,7 +2322,7 @@
           <a:p>
             <a:fld id="{DF9E133C-D775-44AC-B629-43372F2DE94E}" type="datetimeFigureOut">
               <a:rPr lang="en-US" smtClean="0"/>
-              <a:t>19-Mar-21</a:t>
+              <a:t>28-Mar-21</a:t>
             </a:fld>
             <a:endParaRPr lang="en-US"/>
           </a:p>
@@ -2435,7 +2435,7 @@
           <a:p>
             <a:fld id="{DF9E133C-D775-44AC-B629-43372F2DE94E}" type="datetimeFigureOut">
               <a:rPr lang="en-US" smtClean="0"/>
-              <a:t>19-Mar-21</a:t>
+              <a:t>28-Mar-21</a:t>
             </a:fld>
             <a:endParaRPr lang="en-US"/>
           </a:p>
@@ -2746,7 +2746,7 @@
           <a:p>
             <a:fld id="{DF9E133C-D775-44AC-B629-43372F2DE94E}" type="datetimeFigureOut">
               <a:rPr lang="en-US" smtClean="0"/>
-              <a:t>19-Mar-21</a:t>
+              <a:t>28-Mar-21</a:t>
             </a:fld>
             <a:endParaRPr lang="en-US"/>
           </a:p>
@@ -3034,7 +3034,7 @@
           <a:p>
             <a:fld id="{DF9E133C-D775-44AC-B629-43372F2DE94E}" type="datetimeFigureOut">
               <a:rPr lang="en-US" smtClean="0"/>
-              <a:t>19-Mar-21</a:t>
+              <a:t>28-Mar-21</a:t>
             </a:fld>
             <a:endParaRPr lang="en-US"/>
           </a:p>
@@ -3275,7 +3275,7 @@
           <a:p>
             <a:fld id="{DF9E133C-D775-44AC-B629-43372F2DE94E}" type="datetimeFigureOut">
               <a:rPr lang="en-US" smtClean="0"/>
-              <a:t>19-Mar-21</a:t>
+              <a:t>28-Mar-21</a:t>
             </a:fld>
             <a:endParaRPr lang="en-US"/>
           </a:p>
@@ -6549,7 +6549,10 @@
           <a:bodyPr/>
           <a:lstStyle/>
           <a:p>
-            <a:endParaRPr lang="en-US"/>
+            <a:r>
+              <a:rPr lang="en-US" dirty="0"/>
+              <a:t>Cheem tours</a:t>
+            </a:r>
           </a:p>
         </p:txBody>
       </p:sp>
@@ -6571,24 +6574,22 @@
         </p:nvSpPr>
         <p:spPr>
           <a:xfrm>
-            <a:off x="838200" y="1825625"/>
-            <a:ext cx="5257800" cy="4351338"/>
+            <a:off x="838200" y="1797633"/>
+            <a:ext cx="10515600" cy="4351338"/>
           </a:xfrm>
         </p:spPr>
         <p:txBody>
-          <a:bodyPr/>
+          <a:bodyPr numCol="2">
+            <a:normAutofit fontScale="77500" lnSpcReduction="20000"/>
+          </a:bodyPr>
           <a:lstStyle/>
           <a:p>
             <a:pPr marL="0" indent="0">
               <a:buNone/>
             </a:pPr>
             <a:r>
-              <a:rPr lang="en-US" sz="2800" dirty="0">
-                <a:solidFill>
-                  <a:srgbClr val="0070C0"/>
-                </a:solidFill>
-              </a:rPr>
-              <a:t>Trees of Cheem</a:t>
+              <a:rPr lang="en-US" sz="2800" u="sng" dirty="0"/>
+              <a:t>Variant 1</a:t>
             </a:r>
           </a:p>
           <a:p>
@@ -6597,12 +6598,8 @@
               <a:buAutoNum type="arabicPeriod"/>
             </a:pPr>
             <a:r>
-              <a:rPr lang="en-US" sz="2800" dirty="0">
-                <a:solidFill>
-                  <a:srgbClr val="0070C0"/>
-                </a:solidFill>
-              </a:rPr>
-              <a:t>Transform</a:t>
+              <a:rPr lang="en-US" sz="2900" dirty="0"/>
+              <a:t>Input: processed data, class, new observation</a:t>
             </a:r>
           </a:p>
           <a:p>
@@ -6611,12 +6608,16 @@
               <a:buAutoNum type="arabicPeriod"/>
             </a:pPr>
             <a:r>
-              <a:rPr lang="en-US" sz="2800" dirty="0">
-                <a:solidFill>
-                  <a:srgbClr val="0070C0"/>
-                </a:solidFill>
-              </a:rPr>
-              <a:t>Apply, PCA/OLDA; p-dim space</a:t>
+              <a:rPr lang="en-US" sz="2900" dirty="0"/>
+              <a:t>SHAP -- Explain(RF mod, new </a:t>
+            </a:r>
+            <a:r>
+              <a:rPr lang="en-US" sz="2900" dirty="0" err="1"/>
+              <a:t>obs</a:t>
+            </a:r>
+            <a:r>
+              <a:rPr lang="en-US" sz="2900" dirty="0"/>
+              <a:t>)</a:t>
             </a:r>
           </a:p>
           <a:p>
@@ -6625,12 +6626,16 @@
               <a:buAutoNum type="arabicPeriod"/>
             </a:pPr>
             <a:r>
-              <a:rPr lang="en-US" sz="2800" dirty="0">
-                <a:solidFill>
-                  <a:srgbClr val="0070C0"/>
-                </a:solidFill>
-              </a:rPr>
-              <a:t>Fit tree based model</a:t>
+              <a:rPr lang="en-US" sz="2900" dirty="0"/>
+              <a:t>Basis=orthonormalize([normalize(</a:t>
+            </a:r>
+            <a:r>
+              <a:rPr lang="en-US" sz="2900" dirty="0" err="1"/>
+              <a:t>shap</a:t>
+            </a:r>
+            <a:r>
+              <a:rPr lang="en-US" sz="2900" dirty="0"/>
+              <a:t>) | OLDA[first d-1 column])</a:t>
             </a:r>
           </a:p>
           <a:p>
@@ -6639,12 +6644,8 @@
               <a:buAutoNum type="arabicPeriod"/>
             </a:pPr>
             <a:r>
-              <a:rPr lang="en-US" sz="2800" dirty="0">
-                <a:solidFill>
-                  <a:srgbClr val="0070C0"/>
-                </a:solidFill>
-              </a:rPr>
-              <a:t>Use Perm Imp &amp; SHAP to suggest q dim</a:t>
+              <a:rPr lang="en-US" sz="2900" dirty="0"/>
+              <a:t>Freeze the first column, SHAP</a:t>
             </a:r>
           </a:p>
           <a:p>
@@ -6653,32 +6654,118 @@
               <a:buAutoNum type="arabicPeriod"/>
             </a:pPr>
             <a:r>
-              <a:rPr lang="en-US" sz="2800" dirty="0">
-                <a:solidFill>
-                  <a:srgbClr val="0070C0"/>
-                </a:solidFill>
-              </a:rPr>
-              <a:t>Explore tours and </a:t>
-            </a:r>
-            <a:r>
-              <a:rPr lang="en-US" sz="2800" dirty="0" err="1">
-                <a:solidFill>
-                  <a:srgbClr val="0070C0"/>
-                </a:solidFill>
-              </a:rPr>
-              <a:t>tSNE</a:t>
-            </a:r>
-            <a:r>
-              <a:rPr lang="en-US" sz="2800" dirty="0">
-                <a:solidFill>
-                  <a:srgbClr val="0070C0"/>
-                </a:solidFill>
-              </a:rPr>
-              <a:t> while varying q</a:t>
-            </a:r>
-          </a:p>
-          <a:p>
-            <a:endParaRPr lang="en-US" dirty="0"/>
+              <a:rPr lang="en-US" sz="2900" dirty="0"/>
+              <a:t>Output: Grand tour on frozen matrix (</a:t>
+            </a:r>
+            <a:r>
+              <a:rPr lang="en-US" sz="2900" dirty="0" err="1"/>
+              <a:t>shap</a:t>
+            </a:r>
+            <a:r>
+              <a:rPr lang="en-US" sz="2900" dirty="0"/>
+              <a:t> values cannot change, while we wander from OLDA component 1)</a:t>
+            </a:r>
+          </a:p>
+          <a:p>
+            <a:r>
+              <a:rPr lang="en-US" sz="2900" dirty="0"/>
+              <a:t>Feels arbitrary to tack on OLDA component, but may be interesting or boring to only tour on 1 </a:t>
+            </a:r>
+            <a:r>
+              <a:rPr lang="en-US" sz="2900" dirty="0" err="1"/>
+              <a:t>disp</a:t>
+            </a:r>
+            <a:r>
+              <a:rPr lang="en-US" sz="2900" dirty="0"/>
+              <a:t> dim.</a:t>
+            </a:r>
+          </a:p>
+          <a:p>
+            <a:pPr marL="0" indent="0">
+              <a:buNone/>
+            </a:pPr>
+            <a:endParaRPr lang="en-US" u="sng" dirty="0"/>
+          </a:p>
+          <a:p>
+            <a:pPr marL="0" indent="0">
+              <a:buNone/>
+            </a:pPr>
+            <a:r>
+              <a:rPr lang="en-US" u="sng" dirty="0"/>
+              <a:t>Variant 2</a:t>
+            </a:r>
+          </a:p>
+          <a:p>
+            <a:pPr marL="514350" indent="-514350">
+              <a:buFont typeface="+mj-lt"/>
+              <a:buAutoNum type="arabicPeriod"/>
+            </a:pPr>
+            <a:r>
+              <a:rPr lang="en-US" dirty="0"/>
+              <a:t>Input: processed data, class, new observation</a:t>
+            </a:r>
+          </a:p>
+          <a:p>
+            <a:pPr marL="514350" indent="-514350">
+              <a:buFont typeface="+mj-lt"/>
+              <a:buAutoNum type="arabicPeriod"/>
+            </a:pPr>
+            <a:r>
+              <a:rPr lang="en-US" i="1" dirty="0"/>
+              <a:t>Convert to OLDA space</a:t>
+            </a:r>
+          </a:p>
+          <a:p>
+            <a:pPr marL="514350" indent="-514350">
+              <a:buFont typeface="+mj-lt"/>
+              <a:buAutoNum type="arabicPeriod"/>
+            </a:pPr>
+            <a:r>
+              <a:rPr lang="en-US" dirty="0"/>
+              <a:t>SHAP -- Explain(RF mod(</a:t>
+            </a:r>
+            <a:r>
+              <a:rPr lang="en-US" i="1" dirty="0"/>
+              <a:t>OLDA</a:t>
+            </a:r>
+            <a:r>
+              <a:rPr lang="en-US" dirty="0"/>
+              <a:t>), new </a:t>
+            </a:r>
+            <a:r>
+              <a:rPr lang="en-US" dirty="0" err="1"/>
+              <a:t>obs</a:t>
+            </a:r>
+            <a:r>
+              <a:rPr lang="en-US" dirty="0"/>
+              <a:t>)</a:t>
+            </a:r>
+          </a:p>
+          <a:p>
+            <a:pPr marL="514350" indent="-514350">
+              <a:buFont typeface="+mj-lt"/>
+              <a:buAutoNum type="arabicPeriod"/>
+            </a:pPr>
+            <a:r>
+              <a:rPr lang="en-US" dirty="0"/>
+              <a:t>Basis = OLDA components as selected by SHAP</a:t>
+            </a:r>
+          </a:p>
+          <a:p>
+            <a:pPr marL="514350" indent="-514350">
+              <a:buFont typeface="+mj-lt"/>
+              <a:buAutoNum type="arabicPeriod"/>
+            </a:pPr>
+            <a:r>
+              <a:rPr lang="en-US" dirty="0"/>
+              <a:t>Tour normally  (local)</a:t>
+            </a:r>
+          </a:p>
+          <a:p>
+            <a:r>
+              <a:rPr lang="en-US" dirty="0"/>
+              <a:t>May be a better way to produce basis/single linear projection to explain SHAP, but will quickly wander away.</a:t>
+            </a:r>
           </a:p>
         </p:txBody>
       </p:sp>

</xml_diff>

<commit_message>
fix up trees of cheem again(!?)
</commit_message>
<xml_diff>
--- a/zDesignDrafts/Trees_of_Cheem_pitch.pptx
+++ b/zDesignDrafts/Trees_of_Cheem_pitch.pptx
@@ -211,7 +211,7 @@
           <a:p>
             <a:fld id="{C72F94A2-838B-4759-A66F-F5175F9F634D}" type="datetimeFigureOut">
               <a:rPr lang="en-US" smtClean="0"/>
-              <a:t>28-Mar-21</a:t>
+              <a:t>27-Apr-21</a:t>
             </a:fld>
             <a:endParaRPr lang="en-US"/>
           </a:p>
@@ -625,7 +625,7 @@
           <a:p>
             <a:fld id="{DF9E133C-D775-44AC-B629-43372F2DE94E}" type="datetimeFigureOut">
               <a:rPr lang="en-US" smtClean="0"/>
-              <a:t>28-Mar-21</a:t>
+              <a:t>27-Apr-21</a:t>
             </a:fld>
             <a:endParaRPr lang="en-US"/>
           </a:p>
@@ -823,7 +823,7 @@
           <a:p>
             <a:fld id="{DF9E133C-D775-44AC-B629-43372F2DE94E}" type="datetimeFigureOut">
               <a:rPr lang="en-US" smtClean="0"/>
-              <a:t>28-Mar-21</a:t>
+              <a:t>27-Apr-21</a:t>
             </a:fld>
             <a:endParaRPr lang="en-US"/>
           </a:p>
@@ -1031,7 +1031,7 @@
           <a:p>
             <a:fld id="{DF9E133C-D775-44AC-B629-43372F2DE94E}" type="datetimeFigureOut">
               <a:rPr lang="en-US" smtClean="0"/>
-              <a:t>28-Mar-21</a:t>
+              <a:t>27-Apr-21</a:t>
             </a:fld>
             <a:endParaRPr lang="en-US"/>
           </a:p>
@@ -1229,7 +1229,7 @@
           <a:p>
             <a:fld id="{DF9E133C-D775-44AC-B629-43372F2DE94E}" type="datetimeFigureOut">
               <a:rPr lang="en-US" smtClean="0"/>
-              <a:t>28-Mar-21</a:t>
+              <a:t>27-Apr-21</a:t>
             </a:fld>
             <a:endParaRPr lang="en-US"/>
           </a:p>
@@ -1504,7 +1504,7 @@
           <a:p>
             <a:fld id="{DF9E133C-D775-44AC-B629-43372F2DE94E}" type="datetimeFigureOut">
               <a:rPr lang="en-US" smtClean="0"/>
-              <a:t>28-Mar-21</a:t>
+              <a:t>27-Apr-21</a:t>
             </a:fld>
             <a:endParaRPr lang="en-US"/>
           </a:p>
@@ -1769,7 +1769,7 @@
           <a:p>
             <a:fld id="{DF9E133C-D775-44AC-B629-43372F2DE94E}" type="datetimeFigureOut">
               <a:rPr lang="en-US" smtClean="0"/>
-              <a:t>28-Mar-21</a:t>
+              <a:t>27-Apr-21</a:t>
             </a:fld>
             <a:endParaRPr lang="en-US"/>
           </a:p>
@@ -2181,7 +2181,7 @@
           <a:p>
             <a:fld id="{DF9E133C-D775-44AC-B629-43372F2DE94E}" type="datetimeFigureOut">
               <a:rPr lang="en-US" smtClean="0"/>
-              <a:t>28-Mar-21</a:t>
+              <a:t>27-Apr-21</a:t>
             </a:fld>
             <a:endParaRPr lang="en-US"/>
           </a:p>
@@ -2322,7 +2322,7 @@
           <a:p>
             <a:fld id="{DF9E133C-D775-44AC-B629-43372F2DE94E}" type="datetimeFigureOut">
               <a:rPr lang="en-US" smtClean="0"/>
-              <a:t>28-Mar-21</a:t>
+              <a:t>27-Apr-21</a:t>
             </a:fld>
             <a:endParaRPr lang="en-US"/>
           </a:p>
@@ -2435,7 +2435,7 @@
           <a:p>
             <a:fld id="{DF9E133C-D775-44AC-B629-43372F2DE94E}" type="datetimeFigureOut">
               <a:rPr lang="en-US" smtClean="0"/>
-              <a:t>28-Mar-21</a:t>
+              <a:t>27-Apr-21</a:t>
             </a:fld>
             <a:endParaRPr lang="en-US"/>
           </a:p>
@@ -2746,7 +2746,7 @@
           <a:p>
             <a:fld id="{DF9E133C-D775-44AC-B629-43372F2DE94E}" type="datetimeFigureOut">
               <a:rPr lang="en-US" smtClean="0"/>
-              <a:t>28-Mar-21</a:t>
+              <a:t>27-Apr-21</a:t>
             </a:fld>
             <a:endParaRPr lang="en-US"/>
           </a:p>
@@ -3034,7 +3034,7 @@
           <a:p>
             <a:fld id="{DF9E133C-D775-44AC-B629-43372F2DE94E}" type="datetimeFigureOut">
               <a:rPr lang="en-US" smtClean="0"/>
-              <a:t>28-Mar-21</a:t>
+              <a:t>27-Apr-21</a:t>
             </a:fld>
             <a:endParaRPr lang="en-US"/>
           </a:p>
@@ -3275,7 +3275,7 @@
           <a:p>
             <a:fld id="{DF9E133C-D775-44AC-B629-43372F2DE94E}" type="datetimeFigureOut">
               <a:rPr lang="en-US" smtClean="0"/>
-              <a:t>28-Mar-21</a:t>
+              <a:t>27-Apr-21</a:t>
             </a:fld>
             <a:endParaRPr lang="en-US"/>
           </a:p>
@@ -5716,7 +5716,7 @@
         </p:blipFill>
         <p:spPr>
           <a:xfrm>
-            <a:off x="687993" y="2598290"/>
+            <a:off x="626449" y="2598290"/>
             <a:ext cx="4894640" cy="3687933"/>
           </a:xfrm>
           <a:prstGeom prst="rect">
@@ -5826,7 +5826,7 @@
         </p:nvSpPr>
         <p:spPr>
           <a:xfrm>
-            <a:off x="2014158" y="110844"/>
+            <a:off x="2004385" y="62550"/>
             <a:ext cx="2244272" cy="400110"/>
           </a:xfrm>
           <a:prstGeom prst="rect">
@@ -5840,6 +5840,7 @@
           </a:bodyPr>
           <a:lstStyle/>
           <a:p>
+            <a:pPr algn="ctr"/>
             <a:r>
               <a:rPr lang="en-US" sz="2000" dirty="0">
                 <a:solidFill>
@@ -6009,14 +6010,13 @@
           </p:cNvPr>
           <p:cNvCxnSpPr>
             <a:cxnSpLocks/>
-            <a:stCxn id="23" idx="1"/>
           </p:cNvCxnSpPr>
           <p:nvPr/>
         </p:nvCxnSpPr>
         <p:spPr>
           <a:xfrm flipH="1">
-            <a:off x="3173387" y="2180402"/>
-            <a:ext cx="223520" cy="486608"/>
+            <a:off x="3769611" y="2295337"/>
+            <a:ext cx="1" cy="403406"/>
           </a:xfrm>
           <a:prstGeom prst="straightConnector1">
             <a:avLst/>
@@ -6055,8 +6055,8 @@
         </p:nvSpPr>
         <p:spPr>
           <a:xfrm>
-            <a:off x="3396907" y="2026513"/>
-            <a:ext cx="1593757" cy="307777"/>
+            <a:off x="3256231" y="2039452"/>
+            <a:ext cx="1131132" cy="307777"/>
           </a:xfrm>
           <a:prstGeom prst="rect">
             <a:avLst/>
@@ -6135,7 +6135,7 @@
           <a:p>
             <a:r>
               <a:rPr lang="en-US" dirty="0"/>
-              <a:t>Tour work flow</a:t>
+              <a:t>Workflow</a:t>
             </a:r>
             <a:br>
               <a:rPr lang="en-US" dirty="0"/>
@@ -6199,7 +6199,7 @@
             </a:pPr>
             <a:r>
               <a:rPr lang="en-US" sz="2400" dirty="0"/>
-              <a:t>Normal</a:t>
+              <a:t>Typical multivariate EDA, via tours</a:t>
             </a:r>
           </a:p>
           <a:p>
@@ -6219,7 +6219,22 @@
             </a:pPr>
             <a:r>
               <a:rPr lang="en-US" sz="2400" dirty="0"/>
-              <a:t>Apply PCA, embed first q PC</a:t>
+              <a:t>Apply PCA, </a:t>
+            </a:r>
+            <a:br>
+              <a:rPr lang="en-US" sz="2400" dirty="0"/>
+            </a:br>
+            <a:r>
+              <a:rPr lang="en-US" sz="2400" dirty="0"/>
+              <a:t>embed first </a:t>
+            </a:r>
+            <a:r>
+              <a:rPr lang="en-US" sz="2400" i="1" dirty="0"/>
+              <a:t>q</a:t>
+            </a:r>
+            <a:r>
+              <a:rPr lang="en-US" sz="2400" dirty="0"/>
+              <a:t> PC</a:t>
             </a:r>
           </a:p>
           <a:p>
@@ -6229,7 +6244,15 @@
             </a:pPr>
             <a:r>
               <a:rPr lang="en-US" sz="2400" dirty="0"/>
-              <a:t>Tour q-space</a:t>
+              <a:t>Tour </a:t>
+            </a:r>
+            <a:r>
+              <a:rPr lang="en-US" sz="2400" i="1" dirty="0"/>
+              <a:t>q</a:t>
+            </a:r>
+            <a:r>
+              <a:rPr lang="en-US" sz="2400" dirty="0"/>
+              <a:t>-space</a:t>
             </a:r>
           </a:p>
           <a:p>
@@ -6310,7 +6333,23 @@
                   <a:srgbClr val="0070C0"/>
                 </a:solidFill>
               </a:rPr>
-              <a:t>PCA &amp; embed, suggesting q dim</a:t>
+              <a:t>PCA &amp; embed, suggesting </a:t>
+            </a:r>
+            <a:r>
+              <a:rPr lang="en-US" sz="2400" i="1" dirty="0">
+                <a:solidFill>
+                  <a:srgbClr val="0070C0"/>
+                </a:solidFill>
+              </a:rPr>
+              <a:t>q</a:t>
+            </a:r>
+            <a:r>
+              <a:rPr lang="en-US" sz="2400" dirty="0">
+                <a:solidFill>
+                  <a:srgbClr val="0070C0"/>
+                </a:solidFill>
+              </a:rPr>
+              <a:t> dim</a:t>
             </a:r>
           </a:p>
           <a:p>

</xml_diff>

<commit_message>
-touch up trees_of_cheem and email, -refresher on PPforest
</commit_message>
<xml_diff>
--- a/zDesignDrafts/Trees_of_Cheem_pitch.pptx
+++ b/zDesignDrafts/Trees_of_Cheem_pitch.pptx
@@ -5,24 +5,25 @@
     <p:sldMasterId id="2147483648" r:id="rId1"/>
   </p:sldMasterIdLst>
   <p:notesMasterIdLst>
-    <p:notesMasterId r:id="rId17"/>
+    <p:notesMasterId r:id="rId18"/>
   </p:notesMasterIdLst>
   <p:sldIdLst>
     <p:sldId id="274" r:id="rId2"/>
     <p:sldId id="282" r:id="rId3"/>
     <p:sldId id="279" r:id="rId4"/>
-    <p:sldId id="283" r:id="rId5"/>
-    <p:sldId id="278" r:id="rId6"/>
-    <p:sldId id="270" r:id="rId7"/>
-    <p:sldId id="266" r:id="rId8"/>
-    <p:sldId id="273" r:id="rId9"/>
-    <p:sldId id="281" r:id="rId10"/>
-    <p:sldId id="268" r:id="rId11"/>
-    <p:sldId id="262" r:id="rId12"/>
-    <p:sldId id="257" r:id="rId13"/>
-    <p:sldId id="269" r:id="rId14"/>
-    <p:sldId id="263" r:id="rId15"/>
-    <p:sldId id="264" r:id="rId16"/>
+    <p:sldId id="284" r:id="rId5"/>
+    <p:sldId id="283" r:id="rId6"/>
+    <p:sldId id="278" r:id="rId7"/>
+    <p:sldId id="270" r:id="rId8"/>
+    <p:sldId id="266" r:id="rId9"/>
+    <p:sldId id="273" r:id="rId10"/>
+    <p:sldId id="281" r:id="rId11"/>
+    <p:sldId id="268" r:id="rId12"/>
+    <p:sldId id="262" r:id="rId13"/>
+    <p:sldId id="257" r:id="rId14"/>
+    <p:sldId id="269" r:id="rId15"/>
+    <p:sldId id="263" r:id="rId16"/>
+    <p:sldId id="264" r:id="rId17"/>
   </p:sldIdLst>
   <p:sldSz cx="12192000" cy="6858000"/>
   <p:notesSz cx="7010400" cy="9296400"/>
@@ -3721,10 +3722,10 @@
           <a:lstStyle/>
           <a:p>
             <a:r>
-              <a:rPr lang="en-US" dirty="0"/>
+              <a:rPr lang="en-US" sz="3600" dirty="0"/>
               <a:t>Trees of Cheem</a:t>
             </a:r>
-            <a:endParaRPr lang="en-US" dirty="0">
+            <a:endParaRPr lang="en-US" sz="3600" dirty="0">
               <a:solidFill>
                 <a:srgbClr val="0070C0"/>
               </a:solidFill>
@@ -3855,8 +3856,8 @@
         </p:blipFill>
         <p:spPr>
           <a:xfrm>
-            <a:off x="8693217" y="563469"/>
-            <a:ext cx="1047750" cy="1209675"/>
+            <a:off x="7510108" y="706056"/>
+            <a:ext cx="695304" cy="802760"/>
           </a:xfrm>
           <a:prstGeom prst="rect">
             <a:avLst/>
@@ -3892,7 +3893,7 @@
         </p:blipFill>
         <p:spPr bwMode="auto">
           <a:xfrm>
-            <a:off x="4578416" y="2302998"/>
+            <a:off x="4722471" y="1514475"/>
             <a:ext cx="3333750" cy="1914525"/>
           </a:xfrm>
           <a:prstGeom prst="rect">
@@ -3924,7 +3925,7 @@
         </p:nvSpPr>
         <p:spPr>
           <a:xfrm>
-            <a:off x="4494441" y="4288817"/>
+            <a:off x="4634398" y="3523706"/>
             <a:ext cx="4717317" cy="923330"/>
           </a:xfrm>
           <a:prstGeom prst="rect">
@@ -3990,212 +3991,146 @@
           <a:chExt cx="0" cy="0"/>
         </a:xfrm>
       </p:grpSpPr>
-      <p:sp>
-        <p:nvSpPr>
-          <p:cNvPr id="2" name="Title 1">
-            <a:extLst>
-              <a:ext uri="{FF2B5EF4-FFF2-40B4-BE49-F238E27FC236}">
-                <a16:creationId xmlns:a16="http://schemas.microsoft.com/office/drawing/2014/main" id="{F38289A5-E4D5-4C4B-A4A7-DDAE7591A4C7}"/>
-              </a:ext>
-            </a:extLst>
-          </p:cNvPr>
-          <p:cNvSpPr>
-            <a:spLocks noGrp="1"/>
-          </p:cNvSpPr>
-          <p:nvPr>
-            <p:ph type="title"/>
-          </p:nvPr>
-        </p:nvSpPr>
-        <p:spPr/>
-        <p:txBody>
-          <a:bodyPr/>
-          <a:lstStyle/>
-          <a:p>
-            <a:r>
-              <a:rPr lang="en-AU" dirty="0"/>
-              <a:t>Layout – ML EDA</a:t>
-            </a:r>
-            <a:endParaRPr lang="en-US" dirty="0"/>
-          </a:p>
-        </p:txBody>
-      </p:sp>
-      <p:sp>
-        <p:nvSpPr>
-          <p:cNvPr id="3" name="Content Placeholder 2">
-            <a:extLst>
-              <a:ext uri="{FF2B5EF4-FFF2-40B4-BE49-F238E27FC236}">
-                <a16:creationId xmlns:a16="http://schemas.microsoft.com/office/drawing/2014/main" id="{B094FDBC-AA56-4A65-8AAA-51664F20CBA8}"/>
-              </a:ext>
-            </a:extLst>
-          </p:cNvPr>
-          <p:cNvSpPr>
-            <a:spLocks noGrp="1"/>
-          </p:cNvSpPr>
-          <p:nvPr>
-            <p:ph idx="1"/>
-          </p:nvPr>
-        </p:nvSpPr>
+      <p:pic>
+        <p:nvPicPr>
+          <p:cNvPr id="5" name="Picture 4">
+            <a:extLst>
+              <a:ext uri="{FF2B5EF4-FFF2-40B4-BE49-F238E27FC236}">
+                <a16:creationId xmlns:a16="http://schemas.microsoft.com/office/drawing/2014/main" id="{BC98AF37-382F-4173-AEC3-1E61FDE72C01}"/>
+              </a:ext>
+            </a:extLst>
+          </p:cNvPr>
+          <p:cNvPicPr>
+            <a:picLocks noChangeAspect="1"/>
+          </p:cNvPicPr>
+          <p:nvPr/>
+        </p:nvPicPr>
+        <p:blipFill>
+          <a:blip r:embed="rId2"/>
+          <a:stretch>
+            <a:fillRect/>
+          </a:stretch>
+        </p:blipFill>
         <p:spPr>
           <a:xfrm>
-            <a:off x="838200" y="1825625"/>
-            <a:ext cx="10515600" cy="4859260"/>
+            <a:off x="239776" y="-303427"/>
+            <a:ext cx="9267825" cy="6810375"/>
           </a:xfrm>
+          <a:prstGeom prst="rect">
+            <a:avLst/>
+          </a:prstGeom>
         </p:spPr>
-        <p:txBody>
-          <a:bodyPr>
-            <a:normAutofit lnSpcReduction="10000"/>
+      </p:pic>
+      <p:sp>
+        <p:nvSpPr>
+          <p:cNvPr id="6" name="TextBox 5">
+            <a:extLst>
+              <a:ext uri="{FF2B5EF4-FFF2-40B4-BE49-F238E27FC236}">
+                <a16:creationId xmlns:a16="http://schemas.microsoft.com/office/drawing/2014/main" id="{BDFDEE01-94A5-40CF-8090-14BEE6C3DD88}"/>
+              </a:ext>
+            </a:extLst>
+          </p:cNvPr>
+          <p:cNvSpPr txBox="1"/>
+          <p:nvPr/>
+        </p:nvSpPr>
+        <p:spPr>
+          <a:xfrm>
+            <a:off x="71021" y="6506948"/>
+            <a:ext cx="6853561" cy="300082"/>
+          </a:xfrm>
+          <a:prstGeom prst="rect">
+            <a:avLst/>
+          </a:prstGeom>
+          <a:noFill/>
+        </p:spPr>
+        <p:txBody>
+          <a:bodyPr wrap="square" rtlCol="0">
+            <a:spAutoFit/>
           </a:bodyPr>
           <a:lstStyle/>
           <a:p>
-            <a:pPr marL="514350" indent="-514350">
-              <a:buFont typeface="+mj-lt"/>
-              <a:buAutoNum type="arabicPeriod"/>
-            </a:pPr>
-            <a:r>
-              <a:rPr lang="en-AU" dirty="0"/>
-              <a:t>Input data, pre-processing step, summarize, select target variables</a:t>
-            </a:r>
-          </a:p>
-          <a:p>
-            <a:pPr marL="514350" indent="-514350">
-              <a:buFont typeface="+mj-lt"/>
-              <a:buAutoNum type="arabicPeriod"/>
-            </a:pPr>
-            <a:r>
-              <a:rPr lang="en-AU" dirty="0"/>
-              <a:t>Use {</a:t>
-            </a:r>
-            <a:r>
-              <a:rPr lang="en-AU" dirty="0" err="1"/>
-              <a:t>Rdimtools</a:t>
-            </a:r>
-            <a:r>
-              <a:rPr lang="en-AU" dirty="0"/>
-              <a:t>} to estimate the internal data dimensionally, </a:t>
-            </a:r>
-            <a:r>
-              <a:rPr lang="en-AU" dirty="0" err="1"/>
-              <a:t>idd</a:t>
-            </a:r>
-            <a:r>
-              <a:rPr lang="en-AU" dirty="0"/>
-              <a:t>^</a:t>
-            </a:r>
-          </a:p>
-          <a:p>
-            <a:pPr marL="514350" indent="-514350">
-              <a:buFont typeface="+mj-lt"/>
-              <a:buAutoNum type="arabicPeriod"/>
-            </a:pPr>
-            <a:r>
-              <a:rPr lang="en-AU" dirty="0"/>
-              <a:t>Create a stepwise tour; initialize </a:t>
-            </a:r>
-            <a:r>
-              <a:rPr lang="en-AU" dirty="0" err="1"/>
-              <a:t>pca</a:t>
-            </a:r>
-            <a:r>
-              <a:rPr lang="en-AU" dirty="0"/>
-              <a:t>/</a:t>
-            </a:r>
-            <a:r>
-              <a:rPr lang="en-AU" dirty="0" err="1"/>
-              <a:t>olda</a:t>
-            </a:r>
-            <a:r>
-              <a:rPr lang="en-AU" dirty="0"/>
-              <a:t>-space and basis, display at p = </a:t>
-            </a:r>
-            <a:r>
-              <a:rPr lang="en-AU" dirty="0" err="1"/>
-              <a:t>idd</a:t>
-            </a:r>
-            <a:r>
-              <a:rPr lang="en-AU" dirty="0"/>
-              <a:t>^, as part of ensemble graphics[Unwin, 2018] for EDA before ML.</a:t>
-            </a:r>
-            <a:endParaRPr lang="en-US" dirty="0"/>
-          </a:p>
-          <a:p>
-            <a:pPr lvl="1"/>
-            <a:r>
-              <a:rPr lang="en-US" dirty="0"/>
-              <a:t>Step wise tour -&gt; local tour/grand tour, </a:t>
-            </a:r>
-            <a:r>
-              <a:rPr lang="en-US" dirty="0" err="1"/>
-              <a:t>tsne</a:t>
-            </a:r>
-            <a:r>
-              <a:rPr lang="en-US" dirty="0"/>
-              <a:t> or </a:t>
-            </a:r>
-            <a:r>
-              <a:rPr lang="en-US" dirty="0" err="1"/>
-              <a:t>umap</a:t>
-            </a:r>
-            <a:r>
-              <a:rPr lang="en-US" dirty="0"/>
-              <a:t>, PC density, etc.</a:t>
-            </a:r>
-          </a:p>
-          <a:p>
-            <a:pPr lvl="1"/>
-            <a:r>
-              <a:rPr lang="en-US" dirty="0"/>
-              <a:t>Tooltip pointing back to observations in the original data space</a:t>
-            </a:r>
-          </a:p>
-          <a:p>
-            <a:pPr lvl="1"/>
-            <a:r>
-              <a:rPr lang="en-US" dirty="0"/>
-              <a:t>Options for occlusion, k2Density, alpha~1/density, etc.</a:t>
-            </a:r>
-          </a:p>
-          <a:p>
-            <a:pPr marL="514350" indent="-514350">
-              <a:buFont typeface="+mj-lt"/>
-              <a:buAutoNum type="arabicPeriod"/>
-            </a:pPr>
-            <a:r>
-              <a:rPr lang="en-US" dirty="0"/>
-              <a:t>Export</a:t>
-            </a:r>
-          </a:p>
-          <a:p>
-            <a:pPr lvl="1"/>
-            <a:r>
-              <a:rPr lang="en-US" dirty="0"/>
-              <a:t>Embedded PC-space</a:t>
-            </a:r>
-          </a:p>
-          <a:p>
-            <a:pPr lvl="1"/>
-            <a:r>
-              <a:rPr lang="en-US" dirty="0"/>
-              <a:t>Preprocessed data</a:t>
-            </a:r>
-          </a:p>
-          <a:p>
-            <a:pPr lvl="1"/>
-            <a:r>
-              <a:rPr lang="en-AU" dirty="0"/>
-              <a:t>ensemble graphics</a:t>
-            </a:r>
-            <a:endParaRPr lang="en-US" dirty="0"/>
-          </a:p>
-          <a:p>
-            <a:pPr lvl="1"/>
-            <a:endParaRPr lang="en-AU" dirty="0"/>
+            <a:pPr algn="l"/>
+            <a:r>
+              <a:rPr lang="en-US" sz="1350" b="0" dirty="0">
+                <a:solidFill>
+                  <a:srgbClr val="333333"/>
+                </a:solidFill>
+                <a:effectLst/>
+                <a:latin typeface="Arial" panose="020B0604020202020204" pitchFamily="34" charset="0"/>
+                <a:cs typeface="Arial" panose="020B0604020202020204" pitchFamily="34" charset="0"/>
+              </a:rPr>
+              <a:t>Biecek P. &amp; Burzykowski T. (2020). </a:t>
+            </a:r>
+            <a:r>
+              <a:rPr lang="en-US" sz="1350" i="1" dirty="0">
+                <a:solidFill>
+                  <a:srgbClr val="333333"/>
+                </a:solidFill>
+                <a:effectLst/>
+                <a:latin typeface="Arial" panose="020B0604020202020204" pitchFamily="34" charset="0"/>
+                <a:cs typeface="Arial" panose="020B0604020202020204" pitchFamily="34" charset="0"/>
+              </a:rPr>
+              <a:t>Explanatory Model Analysis</a:t>
+            </a:r>
+            <a:r>
+              <a:rPr lang="en-US" sz="1350" i="1" dirty="0">
+                <a:solidFill>
+                  <a:srgbClr val="333333"/>
+                </a:solidFill>
+                <a:latin typeface="Arial" panose="020B0604020202020204" pitchFamily="34" charset="0"/>
+                <a:cs typeface="Arial" panose="020B0604020202020204" pitchFamily="34" charset="0"/>
+              </a:rPr>
+              <a:t>.</a:t>
+            </a:r>
+            <a:r>
+              <a:rPr lang="en-US" sz="1350" b="0" i="1" dirty="0">
+                <a:solidFill>
+                  <a:srgbClr val="333333"/>
+                </a:solidFill>
+                <a:effectLst/>
+                <a:latin typeface="Arial" panose="020B0604020202020204" pitchFamily="34" charset="0"/>
+                <a:cs typeface="Arial" panose="020B0604020202020204" pitchFamily="34" charset="0"/>
+              </a:rPr>
+              <a:t> </a:t>
+            </a:r>
+            <a:r>
+              <a:rPr lang="en-US" sz="1350" b="0" i="1" dirty="0">
+                <a:solidFill>
+                  <a:srgbClr val="333333"/>
+                </a:solidFill>
+                <a:effectLst/>
+                <a:latin typeface="Arial" panose="020B0604020202020204" pitchFamily="34" charset="0"/>
+                <a:cs typeface="Arial" panose="020B0604020202020204" pitchFamily="34" charset="0"/>
+                <a:hlinkClick r:id="rId3"/>
+              </a:rPr>
+              <a:t>http://ema.drwhy.ai/</a:t>
+            </a:r>
+            <a:r>
+              <a:rPr lang="en-US" sz="1350" b="0" i="1" dirty="0">
+                <a:solidFill>
+                  <a:srgbClr val="333333"/>
+                </a:solidFill>
+                <a:effectLst/>
+                <a:latin typeface="Arial" panose="020B0604020202020204" pitchFamily="34" charset="0"/>
+                <a:cs typeface="Arial" panose="020B0604020202020204" pitchFamily="34" charset="0"/>
+              </a:rPr>
+              <a:t> </a:t>
+            </a:r>
+            <a:endParaRPr lang="en-US" sz="1350" b="0" i="0" dirty="0">
+              <a:solidFill>
+                <a:srgbClr val="333333"/>
+              </a:solidFill>
+              <a:effectLst/>
+              <a:latin typeface="Arial" panose="020B0604020202020204" pitchFamily="34" charset="0"/>
+              <a:cs typeface="Arial" panose="020B0604020202020204" pitchFamily="34" charset="0"/>
+            </a:endParaRPr>
           </a:p>
         </p:txBody>
       </p:sp>
     </p:spTree>
     <p:extLst>
       <p:ext uri="{BB962C8B-B14F-4D97-AF65-F5344CB8AC3E}">
-        <p14:creationId xmlns:p14="http://schemas.microsoft.com/office/powerpoint/2010/main" val="441165755"/>
+        <p14:creationId xmlns:p14="http://schemas.microsoft.com/office/powerpoint/2010/main" val="2636067506"/>
       </p:ext>
     </p:extLst>
   </p:cSld>
@@ -4224,6 +4159,238 @@
       </p:grpSpPr>
       <p:sp>
         <p:nvSpPr>
+          <p:cNvPr id="2" name="Title 1">
+            <a:extLst>
+              <a:ext uri="{FF2B5EF4-FFF2-40B4-BE49-F238E27FC236}">
+                <a16:creationId xmlns:a16="http://schemas.microsoft.com/office/drawing/2014/main" id="{F38289A5-E4D5-4C4B-A4A7-DDAE7591A4C7}"/>
+              </a:ext>
+            </a:extLst>
+          </p:cNvPr>
+          <p:cNvSpPr>
+            <a:spLocks noGrp="1"/>
+          </p:cNvSpPr>
+          <p:nvPr>
+            <p:ph type="title"/>
+          </p:nvPr>
+        </p:nvSpPr>
+        <p:spPr/>
+        <p:txBody>
+          <a:bodyPr/>
+          <a:lstStyle/>
+          <a:p>
+            <a:r>
+              <a:rPr lang="en-AU" dirty="0"/>
+              <a:t>Layout – ML EDA</a:t>
+            </a:r>
+            <a:endParaRPr lang="en-US" dirty="0"/>
+          </a:p>
+        </p:txBody>
+      </p:sp>
+      <p:sp>
+        <p:nvSpPr>
+          <p:cNvPr id="3" name="Content Placeholder 2">
+            <a:extLst>
+              <a:ext uri="{FF2B5EF4-FFF2-40B4-BE49-F238E27FC236}">
+                <a16:creationId xmlns:a16="http://schemas.microsoft.com/office/drawing/2014/main" id="{B094FDBC-AA56-4A65-8AAA-51664F20CBA8}"/>
+              </a:ext>
+            </a:extLst>
+          </p:cNvPr>
+          <p:cNvSpPr>
+            <a:spLocks noGrp="1"/>
+          </p:cNvSpPr>
+          <p:nvPr>
+            <p:ph idx="1"/>
+          </p:nvPr>
+        </p:nvSpPr>
+        <p:spPr>
+          <a:xfrm>
+            <a:off x="838200" y="1825625"/>
+            <a:ext cx="10515600" cy="4859260"/>
+          </a:xfrm>
+        </p:spPr>
+        <p:txBody>
+          <a:bodyPr>
+            <a:normAutofit lnSpcReduction="10000"/>
+          </a:bodyPr>
+          <a:lstStyle/>
+          <a:p>
+            <a:pPr marL="514350" indent="-514350">
+              <a:buFont typeface="+mj-lt"/>
+              <a:buAutoNum type="arabicPeriod"/>
+            </a:pPr>
+            <a:r>
+              <a:rPr lang="en-AU" dirty="0"/>
+              <a:t>Input data, pre-processing step, summarize, select target variables</a:t>
+            </a:r>
+          </a:p>
+          <a:p>
+            <a:pPr marL="514350" indent="-514350">
+              <a:buFont typeface="+mj-lt"/>
+              <a:buAutoNum type="arabicPeriod"/>
+            </a:pPr>
+            <a:r>
+              <a:rPr lang="en-AU" dirty="0"/>
+              <a:t>Use {</a:t>
+            </a:r>
+            <a:r>
+              <a:rPr lang="en-AU" dirty="0" err="1"/>
+              <a:t>Rdimtools</a:t>
+            </a:r>
+            <a:r>
+              <a:rPr lang="en-AU" dirty="0"/>
+              <a:t>} to estimate the internal data dimensionally, </a:t>
+            </a:r>
+            <a:r>
+              <a:rPr lang="en-AU" dirty="0" err="1"/>
+              <a:t>idd</a:t>
+            </a:r>
+            <a:r>
+              <a:rPr lang="en-AU" dirty="0"/>
+              <a:t>^</a:t>
+            </a:r>
+          </a:p>
+          <a:p>
+            <a:pPr marL="514350" indent="-514350">
+              <a:buFont typeface="+mj-lt"/>
+              <a:buAutoNum type="arabicPeriod"/>
+            </a:pPr>
+            <a:r>
+              <a:rPr lang="en-AU" dirty="0"/>
+              <a:t>Create a stepwise tour; initialize </a:t>
+            </a:r>
+            <a:r>
+              <a:rPr lang="en-AU" dirty="0" err="1"/>
+              <a:t>pca</a:t>
+            </a:r>
+            <a:r>
+              <a:rPr lang="en-AU" dirty="0"/>
+              <a:t>/</a:t>
+            </a:r>
+            <a:r>
+              <a:rPr lang="en-AU" dirty="0" err="1"/>
+              <a:t>olda</a:t>
+            </a:r>
+            <a:r>
+              <a:rPr lang="en-AU" dirty="0"/>
+              <a:t>-space and basis, display at p = </a:t>
+            </a:r>
+            <a:r>
+              <a:rPr lang="en-AU" dirty="0" err="1"/>
+              <a:t>idd</a:t>
+            </a:r>
+            <a:r>
+              <a:rPr lang="en-AU" dirty="0"/>
+              <a:t>^, as part of ensemble graphics[Unwin, 2018] for EDA before ML.</a:t>
+            </a:r>
+            <a:endParaRPr lang="en-US" dirty="0"/>
+          </a:p>
+          <a:p>
+            <a:pPr lvl="1"/>
+            <a:r>
+              <a:rPr lang="en-US" dirty="0"/>
+              <a:t>Step wise tour -&gt; local tour/grand tour, </a:t>
+            </a:r>
+            <a:r>
+              <a:rPr lang="en-US" dirty="0" err="1"/>
+              <a:t>tsne</a:t>
+            </a:r>
+            <a:r>
+              <a:rPr lang="en-US" dirty="0"/>
+              <a:t> or </a:t>
+            </a:r>
+            <a:r>
+              <a:rPr lang="en-US" dirty="0" err="1"/>
+              <a:t>umap</a:t>
+            </a:r>
+            <a:r>
+              <a:rPr lang="en-US" dirty="0"/>
+              <a:t>, PC density, etc.</a:t>
+            </a:r>
+          </a:p>
+          <a:p>
+            <a:pPr lvl="1"/>
+            <a:r>
+              <a:rPr lang="en-US" dirty="0"/>
+              <a:t>Tooltip pointing back to observations in the original data space</a:t>
+            </a:r>
+          </a:p>
+          <a:p>
+            <a:pPr lvl="1"/>
+            <a:r>
+              <a:rPr lang="en-US" dirty="0"/>
+              <a:t>Options for occlusion, k2Density, alpha~1/density, etc.</a:t>
+            </a:r>
+          </a:p>
+          <a:p>
+            <a:pPr marL="514350" indent="-514350">
+              <a:buFont typeface="+mj-lt"/>
+              <a:buAutoNum type="arabicPeriod"/>
+            </a:pPr>
+            <a:r>
+              <a:rPr lang="en-US" dirty="0"/>
+              <a:t>Export</a:t>
+            </a:r>
+          </a:p>
+          <a:p>
+            <a:pPr lvl="1"/>
+            <a:r>
+              <a:rPr lang="en-US" dirty="0"/>
+              <a:t>Embedded PC-space</a:t>
+            </a:r>
+          </a:p>
+          <a:p>
+            <a:pPr lvl="1"/>
+            <a:r>
+              <a:rPr lang="en-US" dirty="0"/>
+              <a:t>Preprocessed data</a:t>
+            </a:r>
+          </a:p>
+          <a:p>
+            <a:pPr lvl="1"/>
+            <a:r>
+              <a:rPr lang="en-AU" dirty="0"/>
+              <a:t>ensemble graphics</a:t>
+            </a:r>
+            <a:endParaRPr lang="en-US" dirty="0"/>
+          </a:p>
+          <a:p>
+            <a:pPr lvl="1"/>
+            <a:endParaRPr lang="en-AU" dirty="0"/>
+          </a:p>
+        </p:txBody>
+      </p:sp>
+    </p:spTree>
+    <p:extLst>
+      <p:ext uri="{BB962C8B-B14F-4D97-AF65-F5344CB8AC3E}">
+        <p14:creationId xmlns:p14="http://schemas.microsoft.com/office/powerpoint/2010/main" val="441165755"/>
+      </p:ext>
+    </p:extLst>
+  </p:cSld>
+  <p:clrMapOvr>
+    <a:masterClrMapping/>
+  </p:clrMapOvr>
+</p:sld>
+</file>
+
+<file path=ppt/slides/slide12.xml><?xml version="1.0" encoding="utf-8"?>
+<p:sld xmlns:a="http://schemas.openxmlformats.org/drawingml/2006/main" xmlns:r="http://schemas.openxmlformats.org/officeDocument/2006/relationships" xmlns:p="http://schemas.openxmlformats.org/presentationml/2006/main">
+  <p:cSld>
+    <p:spTree>
+      <p:nvGrpSpPr>
+        <p:cNvPr id="1" name=""/>
+        <p:cNvGrpSpPr/>
+        <p:nvPr/>
+      </p:nvGrpSpPr>
+      <p:grpSpPr>
+        <a:xfrm>
+          <a:off x="0" y="0"/>
+          <a:ext cx="0" cy="0"/>
+          <a:chOff x="0" y="0"/>
+          <a:chExt cx="0" cy="0"/>
+        </a:xfrm>
+      </p:grpSpPr>
+      <p:sp>
+        <p:nvSpPr>
           <p:cNvPr id="4" name="Rectangle: Rounded Corners 3">
             <a:extLst>
               <a:ext uri="{FF2B5EF4-FFF2-40B4-BE49-F238E27FC236}">
@@ -4711,7 +4878,7 @@
 </p:sld>
 </file>
 
-<file path=ppt/slides/slide12.xml><?xml version="1.0" encoding="utf-8"?>
+<file path=ppt/slides/slide13.xml><?xml version="1.0" encoding="utf-8"?>
 <p:sld xmlns:a="http://schemas.openxmlformats.org/drawingml/2006/main" xmlns:r="http://schemas.openxmlformats.org/officeDocument/2006/relationships" xmlns:p="http://schemas.openxmlformats.org/presentationml/2006/main">
   <p:cSld>
     <p:spTree>
@@ -5033,7 +5200,7 @@
 </p:sld>
 </file>
 
-<file path=ppt/slides/slide13.xml><?xml version="1.0" encoding="utf-8"?>
+<file path=ppt/slides/slide14.xml><?xml version="1.0" encoding="utf-8"?>
 <p:sld xmlns:a="http://schemas.openxmlformats.org/drawingml/2006/main" xmlns:r="http://schemas.openxmlformats.org/officeDocument/2006/relationships" xmlns:p="http://schemas.openxmlformats.org/presentationml/2006/main">
   <p:cSld>
     <p:spTree>
@@ -5229,7 +5396,7 @@
 </p:sld>
 </file>
 
-<file path=ppt/slides/slide14.xml><?xml version="1.0" encoding="utf-8"?>
+<file path=ppt/slides/slide15.xml><?xml version="1.0" encoding="utf-8"?>
 <p:sld xmlns:a="http://schemas.openxmlformats.org/drawingml/2006/main" xmlns:r="http://schemas.openxmlformats.org/officeDocument/2006/relationships" xmlns:p="http://schemas.openxmlformats.org/presentationml/2006/main">
   <p:cSld>
     <p:spTree>
@@ -5376,7 +5543,7 @@
 </p:sld>
 </file>
 
-<file path=ppt/slides/slide15.xml><?xml version="1.0" encoding="utf-8"?>
+<file path=ppt/slides/slide16.xml><?xml version="1.0" encoding="utf-8"?>
 <p:sld xmlns:a="http://schemas.openxmlformats.org/drawingml/2006/main" xmlns:r="http://schemas.openxmlformats.org/officeDocument/2006/relationships" xmlns:p="http://schemas.openxmlformats.org/presentationml/2006/main">
   <p:cSld>
     <p:spTree>
@@ -5994,7 +6161,7 @@
                 <a:latin typeface="Arial" panose="020B0604020202020204" pitchFamily="34" charset="0"/>
                 <a:cs typeface="Arial" panose="020B0604020202020204" pitchFamily="34" charset="0"/>
               </a:rPr>
-              <a:t>(blue) proposed, Spyrison, N. &amp; Doogan, C.  </a:t>
+              <a:t>(blue) proposed</a:t>
             </a:r>
           </a:p>
         </p:txBody>
@@ -6572,7 +6739,7 @@
           <p:cNvPr id="2" name="Title 1">
             <a:extLst>
               <a:ext uri="{FF2B5EF4-FFF2-40B4-BE49-F238E27FC236}">
-                <a16:creationId xmlns:a16="http://schemas.microsoft.com/office/drawing/2014/main" id="{1273F67D-66D3-4CF5-8844-E5B97128380D}"/>
+                <a16:creationId xmlns:a16="http://schemas.microsoft.com/office/drawing/2014/main" id="{4E064E3D-0B8C-4500-90DB-CF0BD4021C60}"/>
               </a:ext>
             </a:extLst>
           </p:cNvPr>
@@ -6588,19 +6755,177 @@
           <a:bodyPr/>
           <a:lstStyle/>
           <a:p>
-            <a:r>
-              <a:rPr lang="en-US" dirty="0"/>
-              <a:t>Cheem tours</a:t>
-            </a:r>
-          </a:p>
-        </p:txBody>
-      </p:sp>
-      <p:sp>
-        <p:nvSpPr>
-          <p:cNvPr id="3" name="Content Placeholder 2">
-            <a:extLst>
-              <a:ext uri="{FF2B5EF4-FFF2-40B4-BE49-F238E27FC236}">
-                <a16:creationId xmlns:a16="http://schemas.microsoft.com/office/drawing/2014/main" id="{D9289F5D-2D95-41D7-A0F5-7D116621D6C8}"/>
+            <a:endParaRPr lang="en-US"/>
+          </a:p>
+        </p:txBody>
+      </p:sp>
+      <p:sp>
+        <p:nvSpPr>
+          <p:cNvPr id="4" name="Rectangle: Rounded Corners 3">
+            <a:extLst>
+              <a:ext uri="{FF2B5EF4-FFF2-40B4-BE49-F238E27FC236}">
+                <a16:creationId xmlns:a16="http://schemas.microsoft.com/office/drawing/2014/main" id="{C04984A2-98DB-42A2-8FF6-155E1B919FFF}"/>
+              </a:ext>
+            </a:extLst>
+          </p:cNvPr>
+          <p:cNvSpPr/>
+          <p:nvPr/>
+        </p:nvSpPr>
+        <p:spPr>
+          <a:xfrm>
+            <a:off x="671803" y="2155371"/>
+            <a:ext cx="5551714" cy="3452327"/>
+          </a:xfrm>
+          <a:prstGeom prst="roundRect">
+            <a:avLst/>
+          </a:prstGeom>
+        </p:spPr>
+        <p:style>
+          <a:lnRef idx="2">
+            <a:schemeClr val="accent1">
+              <a:shade val="50000"/>
+            </a:schemeClr>
+          </a:lnRef>
+          <a:fillRef idx="1">
+            <a:schemeClr val="accent1"/>
+          </a:fillRef>
+          <a:effectRef idx="0">
+            <a:schemeClr val="accent1"/>
+          </a:effectRef>
+          <a:fontRef idx="minor">
+            <a:schemeClr val="lt1"/>
+          </a:fontRef>
+        </p:style>
+        <p:txBody>
+          <a:bodyPr rtlCol="0" anchor="t"/>
+          <a:lstStyle/>
+          <a:p>
+            <a:r>
+              <a:rPr lang="en-US" dirty="0" err="1"/>
+              <a:t>basis_cheem</a:t>
+            </a:r>
+            <a:r>
+              <a:rPr lang="en-US" dirty="0"/>
+              <a:t>(*){</a:t>
+            </a:r>
+          </a:p>
+          <a:p>
+            <a:r>
+              <a:rPr lang="en-US" dirty="0"/>
+              <a:t>  rf &lt;- </a:t>
+            </a:r>
+            <a:r>
+              <a:rPr lang="en-US" dirty="0" err="1"/>
+              <a:t>randomForest</a:t>
+            </a:r>
+            <a:r>
+              <a:rPr lang="en-US" dirty="0"/>
+              <a:t>::</a:t>
+            </a:r>
+            <a:r>
+              <a:rPr lang="en-US" dirty="0" err="1"/>
+              <a:t>randomForest</a:t>
+            </a:r>
+            <a:r>
+              <a:rPr lang="en-US" dirty="0"/>
+              <a:t>()</a:t>
+            </a:r>
+          </a:p>
+          <a:p>
+            <a:r>
+              <a:rPr lang="en-US" dirty="0"/>
+              <a:t>  ex &lt;- DALEX::explain()</a:t>
+            </a:r>
+          </a:p>
+          <a:p>
+            <a:r>
+              <a:rPr lang="en-US" dirty="0"/>
+              <a:t>  parts &lt;- DALEX::</a:t>
+            </a:r>
+            <a:r>
+              <a:rPr lang="en-US" dirty="0" err="1"/>
+              <a:t>predict_parts</a:t>
+            </a:r>
+            <a:r>
+              <a:rPr lang="en-US" dirty="0"/>
+              <a:t>()</a:t>
+            </a:r>
+          </a:p>
+          <a:p>
+            <a:r>
+              <a:rPr lang="en-US" dirty="0"/>
+              <a:t>  </a:t>
+            </a:r>
+            <a:r>
+              <a:rPr lang="en-US" dirty="0" err="1"/>
+              <a:t>local_attr</a:t>
+            </a:r>
+            <a:r>
+              <a:rPr lang="en-US" dirty="0"/>
+              <a:t> &lt;- f(parts) | [px1] </a:t>
+            </a:r>
+          </a:p>
+          <a:p>
+            <a:r>
+              <a:rPr lang="en-US" dirty="0"/>
+              <a:t>  bas &lt;- </a:t>
+            </a:r>
+            <a:r>
+              <a:rPr lang="en-US" dirty="0" err="1"/>
+              <a:t>basis_func</a:t>
+            </a:r>
+            <a:r>
+              <a:rPr lang="en-US" dirty="0"/>
+              <a:t>() | [</a:t>
+            </a:r>
+            <a:r>
+              <a:rPr lang="en-US" dirty="0" err="1"/>
+              <a:t>pxd</a:t>
+            </a:r>
+            <a:r>
+              <a:rPr lang="en-US" dirty="0"/>
+              <a:t>] </a:t>
+            </a:r>
+          </a:p>
+          <a:p>
+            <a:endParaRPr lang="en-US" dirty="0"/>
+          </a:p>
+          <a:p>
+            <a:r>
+              <a:rPr lang="en-US" dirty="0"/>
+              <a:t>  basis &lt;- orthonormalize(</a:t>
+            </a:r>
+            <a:r>
+              <a:rPr lang="en-US" dirty="0" err="1"/>
+              <a:t>cbind</a:t>
+            </a:r>
+            <a:r>
+              <a:rPr lang="en-US" dirty="0"/>
+              <a:t>(</a:t>
+            </a:r>
+            <a:r>
+              <a:rPr lang="en-US" dirty="0" err="1"/>
+              <a:t>local_attr</a:t>
+            </a:r>
+            <a:r>
+              <a:rPr lang="en-US" dirty="0"/>
+              <a:t> , bas))   </a:t>
+            </a:r>
+          </a:p>
+          <a:p>
+            <a:r>
+              <a:rPr lang="en-US" dirty="0"/>
+              <a:t>}</a:t>
+            </a:r>
+          </a:p>
+        </p:txBody>
+      </p:sp>
+      <p:sp>
+        <p:nvSpPr>
+          <p:cNvPr id="5" name="Content Placeholder 4">
+            <a:extLst>
+              <a:ext uri="{FF2B5EF4-FFF2-40B4-BE49-F238E27FC236}">
+                <a16:creationId xmlns:a16="http://schemas.microsoft.com/office/drawing/2014/main" id="{0758048B-B4DB-439C-BE63-CD4DCE03F50A}"/>
               </a:ext>
             </a:extLst>
           </p:cNvPr>
@@ -6613,13 +6938,32 @@
         </p:nvSpPr>
         <p:spPr>
           <a:xfrm>
-            <a:off x="838200" y="1797633"/>
-            <a:ext cx="10515600" cy="4351338"/>
+            <a:off x="6433423" y="2179721"/>
+            <a:ext cx="4920377" cy="2498557"/>
           </a:xfrm>
+          <a:prstGeom prst="roundRect">
+            <a:avLst/>
+          </a:prstGeom>
         </p:spPr>
-        <p:txBody>
-          <a:bodyPr numCol="2">
-            <a:normAutofit fontScale="77500" lnSpcReduction="20000"/>
+        <p:style>
+          <a:lnRef idx="2">
+            <a:schemeClr val="accent1">
+              <a:shade val="50000"/>
+            </a:schemeClr>
+          </a:lnRef>
+          <a:fillRef idx="1">
+            <a:schemeClr val="accent1"/>
+          </a:fillRef>
+          <a:effectRef idx="0">
+            <a:schemeClr val="accent1"/>
+          </a:effectRef>
+          <a:fontRef idx="minor">
+            <a:schemeClr val="lt1"/>
+          </a:fontRef>
+        </p:style>
+        <p:txBody>
+          <a:bodyPr rtlCol="0" anchor="t">
+            <a:normAutofit/>
           </a:bodyPr>
           <a:lstStyle/>
           <a:p>
@@ -6627,183 +6971,63 @@
               <a:buNone/>
             </a:pPr>
             <a:r>
-              <a:rPr lang="en-US" sz="2800" u="sng" dirty="0"/>
-              <a:t>Variant 1</a:t>
-            </a:r>
-          </a:p>
-          <a:p>
-            <a:pPr marL="514350" indent="-514350">
-              <a:buFont typeface="+mj-lt"/>
-              <a:buAutoNum type="arabicPeriod"/>
-            </a:pPr>
-            <a:r>
-              <a:rPr lang="en-US" sz="2900" dirty="0"/>
-              <a:t>Input: processed data, class, new observation</a:t>
-            </a:r>
-          </a:p>
-          <a:p>
-            <a:pPr marL="514350" indent="-514350">
-              <a:buFont typeface="+mj-lt"/>
-              <a:buAutoNum type="arabicPeriod"/>
-            </a:pPr>
-            <a:r>
-              <a:rPr lang="en-US" sz="2900" dirty="0"/>
-              <a:t>SHAP -- Explain(RF mod, new </a:t>
-            </a:r>
-            <a:r>
-              <a:rPr lang="en-US" sz="2900" dirty="0" err="1"/>
-              <a:t>obs</a:t>
-            </a:r>
-            <a:r>
-              <a:rPr lang="en-US" sz="2900" dirty="0"/>
-              <a:t>)</a:t>
-            </a:r>
-          </a:p>
-          <a:p>
-            <a:pPr marL="514350" indent="-514350">
-              <a:buFont typeface="+mj-lt"/>
-              <a:buAutoNum type="arabicPeriod"/>
-            </a:pPr>
-            <a:r>
-              <a:rPr lang="en-US" sz="2900" dirty="0"/>
-              <a:t>Basis=orthonormalize([normalize(</a:t>
-            </a:r>
-            <a:r>
-              <a:rPr lang="en-US" sz="2900" dirty="0" err="1"/>
-              <a:t>shap</a:t>
-            </a:r>
-            <a:r>
-              <a:rPr lang="en-US" sz="2900" dirty="0"/>
-              <a:t>) | OLDA[first d-1 column])</a:t>
-            </a:r>
-          </a:p>
-          <a:p>
-            <a:pPr marL="514350" indent="-514350">
-              <a:buFont typeface="+mj-lt"/>
-              <a:buAutoNum type="arabicPeriod"/>
-            </a:pPr>
-            <a:r>
-              <a:rPr lang="en-US" sz="2900" dirty="0"/>
-              <a:t>Freeze the first column, SHAP</a:t>
-            </a:r>
-          </a:p>
-          <a:p>
-            <a:pPr marL="514350" indent="-514350">
-              <a:buFont typeface="+mj-lt"/>
-              <a:buAutoNum type="arabicPeriod"/>
-            </a:pPr>
-            <a:r>
-              <a:rPr lang="en-US" sz="2900" dirty="0"/>
-              <a:t>Output: Grand tour on frozen matrix (</a:t>
-            </a:r>
-            <a:r>
-              <a:rPr lang="en-US" sz="2900" dirty="0" err="1"/>
-              <a:t>shap</a:t>
-            </a:r>
-            <a:r>
-              <a:rPr lang="en-US" sz="2900" dirty="0"/>
-              <a:t> values cannot change, while we wander from OLDA component 1)</a:t>
-            </a:r>
-          </a:p>
-          <a:p>
-            <a:r>
-              <a:rPr lang="en-US" sz="2900" dirty="0"/>
-              <a:t>Feels arbitrary to tack on OLDA component, but may be interesting or boring to only tour on 1 </a:t>
-            </a:r>
-            <a:r>
-              <a:rPr lang="en-US" sz="2900" dirty="0" err="1"/>
-              <a:t>disp</a:t>
-            </a:r>
-            <a:r>
-              <a:rPr lang="en-US" sz="2900" dirty="0"/>
-              <a:t> dim.</a:t>
+              <a:rPr lang="en-US" sz="1800" dirty="0" err="1"/>
+              <a:t>view_cheem</a:t>
+            </a:r>
+            <a:r>
+              <a:rPr lang="en-US" sz="1800" dirty="0"/>
+              <a:t>(</a:t>
+            </a:r>
+            <a:r>
+              <a:rPr lang="en-US" sz="1800" dirty="0" err="1"/>
+              <a:t>cheem_basis</a:t>
+            </a:r>
+            <a:r>
+              <a:rPr lang="en-US" sz="1800" dirty="0"/>
+              <a:t>){</a:t>
             </a:r>
           </a:p>
           <a:p>
             <a:pPr marL="0" indent="0">
               <a:buNone/>
             </a:pPr>
-            <a:endParaRPr lang="en-US" u="sng" dirty="0"/>
+            <a:r>
+              <a:rPr lang="en-US" sz="1800" dirty="0"/>
+              <a:t>  gg &lt;- spinifex::</a:t>
+            </a:r>
+            <a:r>
+              <a:rPr lang="en-US" sz="1800" dirty="0" err="1"/>
+              <a:t>view_frame</a:t>
+            </a:r>
+            <a:r>
+              <a:rPr lang="en-US" sz="1800" dirty="0"/>
+              <a:t>()</a:t>
+            </a:r>
           </a:p>
           <a:p>
             <a:pPr marL="0" indent="0">
               <a:buNone/>
             </a:pPr>
             <a:r>
-              <a:rPr lang="en-US" u="sng" dirty="0"/>
-              <a:t>Variant 2</a:t>
-            </a:r>
-          </a:p>
-          <a:p>
-            <a:pPr marL="514350" indent="-514350">
-              <a:buFont typeface="+mj-lt"/>
-              <a:buAutoNum type="arabicPeriod"/>
+              <a:rPr lang="en-US" sz="1800" dirty="0"/>
+              <a:t>  gg + </a:t>
+            </a:r>
+            <a:r>
+              <a:rPr lang="en-US" sz="1800" dirty="0" err="1"/>
+              <a:t>plot.parts</a:t>
+            </a:r>
+            <a:r>
+              <a:rPr lang="en-US" sz="1800" dirty="0"/>
+              <a:t>(parts)</a:t>
+            </a:r>
+          </a:p>
+          <a:p>
+            <a:pPr marL="0" indent="0">
+              <a:buNone/>
             </a:pPr>
             <a:r>
-              <a:rPr lang="en-US" dirty="0"/>
-              <a:t>Input: processed data, class, new observation</a:t>
-            </a:r>
-          </a:p>
-          <a:p>
-            <a:pPr marL="514350" indent="-514350">
-              <a:buFont typeface="+mj-lt"/>
-              <a:buAutoNum type="arabicPeriod"/>
-            </a:pPr>
-            <a:r>
-              <a:rPr lang="en-US" i="1" dirty="0"/>
-              <a:t>Convert to OLDA space</a:t>
-            </a:r>
-          </a:p>
-          <a:p>
-            <a:pPr marL="514350" indent="-514350">
-              <a:buFont typeface="+mj-lt"/>
-              <a:buAutoNum type="arabicPeriod"/>
-            </a:pPr>
-            <a:r>
-              <a:rPr lang="en-US" dirty="0"/>
-              <a:t>SHAP -- Explain(RF mod(</a:t>
-            </a:r>
-            <a:r>
-              <a:rPr lang="en-US" i="1" dirty="0"/>
-              <a:t>OLDA</a:t>
-            </a:r>
-            <a:r>
-              <a:rPr lang="en-US" dirty="0"/>
-              <a:t>), new </a:t>
-            </a:r>
-            <a:r>
-              <a:rPr lang="en-US" dirty="0" err="1"/>
-              <a:t>obs</a:t>
-            </a:r>
-            <a:r>
-              <a:rPr lang="en-US" dirty="0"/>
-              <a:t>)</a:t>
-            </a:r>
-          </a:p>
-          <a:p>
-            <a:pPr marL="514350" indent="-514350">
-              <a:buFont typeface="+mj-lt"/>
-              <a:buAutoNum type="arabicPeriod"/>
-            </a:pPr>
-            <a:r>
-              <a:rPr lang="en-US" dirty="0"/>
-              <a:t>Basis = OLDA components as selected by SHAP</a:t>
-            </a:r>
-          </a:p>
-          <a:p>
-            <a:pPr marL="514350" indent="-514350">
-              <a:buFont typeface="+mj-lt"/>
-              <a:buAutoNum type="arabicPeriod"/>
-            </a:pPr>
-            <a:r>
-              <a:rPr lang="en-US" dirty="0"/>
-              <a:t>Tour normally  (local)</a:t>
-            </a:r>
-          </a:p>
-          <a:p>
-            <a:r>
-              <a:rPr lang="en-US" dirty="0"/>
-              <a:t>May be a better way to produce basis/single linear projection to explain SHAP, but will quickly wander away.</a:t>
+              <a:rPr lang="en-US" sz="1800" dirty="0"/>
+              <a:t>}</a:t>
             </a:r>
           </a:p>
         </p:txBody>
@@ -6811,7 +7035,7 @@
     </p:spTree>
     <p:extLst>
       <p:ext uri="{BB962C8B-B14F-4D97-AF65-F5344CB8AC3E}">
-        <p14:creationId xmlns:p14="http://schemas.microsoft.com/office/powerpoint/2010/main" val="104460537"/>
+        <p14:creationId xmlns:p14="http://schemas.microsoft.com/office/powerpoint/2010/main" val="2635259718"/>
       </p:ext>
     </p:extLst>
   </p:cSld>
@@ -6843,6 +7067,277 @@
           <p:cNvPr id="2" name="Title 1">
             <a:extLst>
               <a:ext uri="{FF2B5EF4-FFF2-40B4-BE49-F238E27FC236}">
+                <a16:creationId xmlns:a16="http://schemas.microsoft.com/office/drawing/2014/main" id="{1273F67D-66D3-4CF5-8844-E5B97128380D}"/>
+              </a:ext>
+            </a:extLst>
+          </p:cNvPr>
+          <p:cNvSpPr>
+            <a:spLocks noGrp="1"/>
+          </p:cNvSpPr>
+          <p:nvPr>
+            <p:ph type="title"/>
+          </p:nvPr>
+        </p:nvSpPr>
+        <p:spPr/>
+        <p:txBody>
+          <a:bodyPr/>
+          <a:lstStyle/>
+          <a:p>
+            <a:r>
+              <a:rPr lang="en-US" dirty="0"/>
+              <a:t>Cheem tours</a:t>
+            </a:r>
+          </a:p>
+        </p:txBody>
+      </p:sp>
+      <p:sp>
+        <p:nvSpPr>
+          <p:cNvPr id="3" name="Content Placeholder 2">
+            <a:extLst>
+              <a:ext uri="{FF2B5EF4-FFF2-40B4-BE49-F238E27FC236}">
+                <a16:creationId xmlns:a16="http://schemas.microsoft.com/office/drawing/2014/main" id="{D9289F5D-2D95-41D7-A0F5-7D116621D6C8}"/>
+              </a:ext>
+            </a:extLst>
+          </p:cNvPr>
+          <p:cNvSpPr>
+            <a:spLocks noGrp="1"/>
+          </p:cNvSpPr>
+          <p:nvPr>
+            <p:ph idx="1"/>
+          </p:nvPr>
+        </p:nvSpPr>
+        <p:spPr>
+          <a:xfrm>
+            <a:off x="838200" y="1797633"/>
+            <a:ext cx="10515600" cy="4351338"/>
+          </a:xfrm>
+        </p:spPr>
+        <p:txBody>
+          <a:bodyPr numCol="2">
+            <a:normAutofit fontScale="77500" lnSpcReduction="20000"/>
+          </a:bodyPr>
+          <a:lstStyle/>
+          <a:p>
+            <a:pPr marL="0" indent="0">
+              <a:buNone/>
+            </a:pPr>
+            <a:r>
+              <a:rPr lang="en-US" sz="2800" u="sng" dirty="0"/>
+              <a:t>Variant 1</a:t>
+            </a:r>
+          </a:p>
+          <a:p>
+            <a:pPr marL="514350" indent="-514350">
+              <a:buFont typeface="+mj-lt"/>
+              <a:buAutoNum type="arabicPeriod"/>
+            </a:pPr>
+            <a:r>
+              <a:rPr lang="en-US" sz="2900" dirty="0"/>
+              <a:t>Input: processed data, class, new observation</a:t>
+            </a:r>
+          </a:p>
+          <a:p>
+            <a:pPr marL="514350" indent="-514350">
+              <a:buFont typeface="+mj-lt"/>
+              <a:buAutoNum type="arabicPeriod"/>
+            </a:pPr>
+            <a:r>
+              <a:rPr lang="en-US" sz="2900" dirty="0"/>
+              <a:t>SHAP -- Explain(RF mod, new </a:t>
+            </a:r>
+            <a:r>
+              <a:rPr lang="en-US" sz="2900" dirty="0" err="1"/>
+              <a:t>obs</a:t>
+            </a:r>
+            <a:r>
+              <a:rPr lang="en-US" sz="2900" dirty="0"/>
+              <a:t>)</a:t>
+            </a:r>
+          </a:p>
+          <a:p>
+            <a:pPr marL="514350" indent="-514350">
+              <a:buFont typeface="+mj-lt"/>
+              <a:buAutoNum type="arabicPeriod"/>
+            </a:pPr>
+            <a:r>
+              <a:rPr lang="en-US" sz="2900" dirty="0"/>
+              <a:t>Basis=orthonormalize([normalize(</a:t>
+            </a:r>
+            <a:r>
+              <a:rPr lang="en-US" sz="2900" dirty="0" err="1"/>
+              <a:t>shap</a:t>
+            </a:r>
+            <a:r>
+              <a:rPr lang="en-US" sz="2900" dirty="0"/>
+              <a:t>) | OLDA[first d-1 column])</a:t>
+            </a:r>
+          </a:p>
+          <a:p>
+            <a:pPr marL="514350" indent="-514350">
+              <a:buFont typeface="+mj-lt"/>
+              <a:buAutoNum type="arabicPeriod"/>
+            </a:pPr>
+            <a:r>
+              <a:rPr lang="en-US" sz="2900" dirty="0"/>
+              <a:t>Freeze the first column, SHAP</a:t>
+            </a:r>
+          </a:p>
+          <a:p>
+            <a:pPr marL="514350" indent="-514350">
+              <a:buFont typeface="+mj-lt"/>
+              <a:buAutoNum type="arabicPeriod"/>
+            </a:pPr>
+            <a:r>
+              <a:rPr lang="en-US" sz="2900" dirty="0"/>
+              <a:t>Output: Grand tour on frozen matrix (</a:t>
+            </a:r>
+            <a:r>
+              <a:rPr lang="en-US" sz="2900" dirty="0" err="1"/>
+              <a:t>shap</a:t>
+            </a:r>
+            <a:r>
+              <a:rPr lang="en-US" sz="2900" dirty="0"/>
+              <a:t> values cannot change, while we wander from OLDA component 1)</a:t>
+            </a:r>
+          </a:p>
+          <a:p>
+            <a:r>
+              <a:rPr lang="en-US" sz="2900" dirty="0"/>
+              <a:t>Feels arbitrary to tack on OLDA component, but may be interesting or boring to only tour on 1 </a:t>
+            </a:r>
+            <a:r>
+              <a:rPr lang="en-US" sz="2900" dirty="0" err="1"/>
+              <a:t>disp</a:t>
+            </a:r>
+            <a:r>
+              <a:rPr lang="en-US" sz="2900" dirty="0"/>
+              <a:t> dim.</a:t>
+            </a:r>
+          </a:p>
+          <a:p>
+            <a:pPr marL="0" indent="0">
+              <a:buNone/>
+            </a:pPr>
+            <a:endParaRPr lang="en-US" u="sng" dirty="0"/>
+          </a:p>
+          <a:p>
+            <a:pPr marL="0" indent="0">
+              <a:buNone/>
+            </a:pPr>
+            <a:r>
+              <a:rPr lang="en-US" u="sng" dirty="0"/>
+              <a:t>Variant 2</a:t>
+            </a:r>
+          </a:p>
+          <a:p>
+            <a:pPr marL="514350" indent="-514350">
+              <a:buFont typeface="+mj-lt"/>
+              <a:buAutoNum type="arabicPeriod"/>
+            </a:pPr>
+            <a:r>
+              <a:rPr lang="en-US" dirty="0"/>
+              <a:t>Input: processed data, class, new observation</a:t>
+            </a:r>
+          </a:p>
+          <a:p>
+            <a:pPr marL="514350" indent="-514350">
+              <a:buFont typeface="+mj-lt"/>
+              <a:buAutoNum type="arabicPeriod"/>
+            </a:pPr>
+            <a:r>
+              <a:rPr lang="en-US" i="1" dirty="0"/>
+              <a:t>Convert to OLDA space</a:t>
+            </a:r>
+          </a:p>
+          <a:p>
+            <a:pPr marL="514350" indent="-514350">
+              <a:buFont typeface="+mj-lt"/>
+              <a:buAutoNum type="arabicPeriod"/>
+            </a:pPr>
+            <a:r>
+              <a:rPr lang="en-US" dirty="0"/>
+              <a:t>SHAP -- Explain(RF mod(</a:t>
+            </a:r>
+            <a:r>
+              <a:rPr lang="en-US" i="1" dirty="0"/>
+              <a:t>OLDA</a:t>
+            </a:r>
+            <a:r>
+              <a:rPr lang="en-US" dirty="0"/>
+              <a:t>), new </a:t>
+            </a:r>
+            <a:r>
+              <a:rPr lang="en-US" dirty="0" err="1"/>
+              <a:t>obs</a:t>
+            </a:r>
+            <a:r>
+              <a:rPr lang="en-US" dirty="0"/>
+              <a:t>)</a:t>
+            </a:r>
+          </a:p>
+          <a:p>
+            <a:pPr marL="514350" indent="-514350">
+              <a:buFont typeface="+mj-lt"/>
+              <a:buAutoNum type="arabicPeriod"/>
+            </a:pPr>
+            <a:r>
+              <a:rPr lang="en-US" dirty="0"/>
+              <a:t>Basis = OLDA components as selected by SHAP</a:t>
+            </a:r>
+          </a:p>
+          <a:p>
+            <a:pPr marL="514350" indent="-514350">
+              <a:buFont typeface="+mj-lt"/>
+              <a:buAutoNum type="arabicPeriod"/>
+            </a:pPr>
+            <a:r>
+              <a:rPr lang="en-US" dirty="0"/>
+              <a:t>Tour normally  (local)</a:t>
+            </a:r>
+          </a:p>
+          <a:p>
+            <a:r>
+              <a:rPr lang="en-US" dirty="0"/>
+              <a:t>May be a better way to produce basis/single linear projection to explain SHAP, but will quickly wander away.</a:t>
+            </a:r>
+          </a:p>
+        </p:txBody>
+      </p:sp>
+    </p:spTree>
+    <p:extLst>
+      <p:ext uri="{BB962C8B-B14F-4D97-AF65-F5344CB8AC3E}">
+        <p14:creationId xmlns:p14="http://schemas.microsoft.com/office/powerpoint/2010/main" val="104460537"/>
+      </p:ext>
+    </p:extLst>
+  </p:cSld>
+  <p:clrMapOvr>
+    <a:masterClrMapping/>
+  </p:clrMapOvr>
+</p:sld>
+</file>
+
+<file path=ppt/slides/slide6.xml><?xml version="1.0" encoding="utf-8"?>
+<p:sld xmlns:a="http://schemas.openxmlformats.org/drawingml/2006/main" xmlns:r="http://schemas.openxmlformats.org/officeDocument/2006/relationships" xmlns:p="http://schemas.openxmlformats.org/presentationml/2006/main">
+  <p:cSld>
+    <p:spTree>
+      <p:nvGrpSpPr>
+        <p:cNvPr id="1" name=""/>
+        <p:cNvGrpSpPr/>
+        <p:nvPr/>
+      </p:nvGrpSpPr>
+      <p:grpSpPr>
+        <a:xfrm>
+          <a:off x="0" y="0"/>
+          <a:ext cx="0" cy="0"/>
+          <a:chOff x="0" y="0"/>
+          <a:chExt cx="0" cy="0"/>
+        </a:xfrm>
+      </p:grpSpPr>
+      <p:sp>
+        <p:nvSpPr>
+          <p:cNvPr id="2" name="Title 1">
+            <a:extLst>
+              <a:ext uri="{FF2B5EF4-FFF2-40B4-BE49-F238E27FC236}">
                 <a16:creationId xmlns:a16="http://schemas.microsoft.com/office/drawing/2014/main" id="{DDC34027-6605-438D-B11D-FAC068850194}"/>
               </a:ext>
             </a:extLst>
@@ -6904,7 +7399,7 @@
 </p:sld>
 </file>
 
-<file path=ppt/slides/slide6.xml><?xml version="1.0" encoding="utf-8"?>
+<file path=ppt/slides/slide7.xml><?xml version="1.0" encoding="utf-8"?>
 <p:sld xmlns:a="http://schemas.openxmlformats.org/drawingml/2006/main" xmlns:r="http://schemas.openxmlformats.org/officeDocument/2006/relationships" xmlns:p="http://schemas.openxmlformats.org/presentationml/2006/main">
   <p:cSld>
     <p:spTree>
@@ -7053,7 +7548,7 @@
 </p:sld>
 </file>
 
-<file path=ppt/slides/slide7.xml><?xml version="1.0" encoding="utf-8"?>
+<file path=ppt/slides/slide8.xml><?xml version="1.0" encoding="utf-8"?>
 <p:sld xmlns:a="http://schemas.openxmlformats.org/drawingml/2006/main" xmlns:r="http://schemas.openxmlformats.org/officeDocument/2006/relationships" xmlns:p="http://schemas.openxmlformats.org/presentationml/2006/main">
   <p:cSld>
     <p:spTree>
@@ -7349,7 +7844,7 @@
 </p:sld>
 </file>
 
-<file path=ppt/slides/slide8.xml><?xml version="1.0" encoding="utf-8"?>
+<file path=ppt/slides/slide9.xml><?xml version="1.0" encoding="utf-8"?>
 <p:sld xmlns:a="http://schemas.openxmlformats.org/drawingml/2006/main" xmlns:r="http://schemas.openxmlformats.org/officeDocument/2006/relationships" xmlns:p="http://schemas.openxmlformats.org/presentationml/2006/main">
   <p:cSld>
     <p:spTree>
@@ -7933,172 +8428,6 @@
     <p:extLst>
       <p:ext uri="{BB962C8B-B14F-4D97-AF65-F5344CB8AC3E}">
         <p14:creationId xmlns:p14="http://schemas.microsoft.com/office/powerpoint/2010/main" val="3080668156"/>
-      </p:ext>
-    </p:extLst>
-  </p:cSld>
-  <p:clrMapOvr>
-    <a:masterClrMapping/>
-  </p:clrMapOvr>
-</p:sld>
-</file>
-
-<file path=ppt/slides/slide9.xml><?xml version="1.0" encoding="utf-8"?>
-<p:sld xmlns:a="http://schemas.openxmlformats.org/drawingml/2006/main" xmlns:r="http://schemas.openxmlformats.org/officeDocument/2006/relationships" xmlns:p="http://schemas.openxmlformats.org/presentationml/2006/main">
-  <p:cSld>
-    <p:spTree>
-      <p:nvGrpSpPr>
-        <p:cNvPr id="1" name=""/>
-        <p:cNvGrpSpPr/>
-        <p:nvPr/>
-      </p:nvGrpSpPr>
-      <p:grpSpPr>
-        <a:xfrm>
-          <a:off x="0" y="0"/>
-          <a:ext cx="0" cy="0"/>
-          <a:chOff x="0" y="0"/>
-          <a:chExt cx="0" cy="0"/>
-        </a:xfrm>
-      </p:grpSpPr>
-      <p:pic>
-        <p:nvPicPr>
-          <p:cNvPr id="5" name="Picture 4">
-            <a:extLst>
-              <a:ext uri="{FF2B5EF4-FFF2-40B4-BE49-F238E27FC236}">
-                <a16:creationId xmlns:a16="http://schemas.microsoft.com/office/drawing/2014/main" id="{BC98AF37-382F-4173-AEC3-1E61FDE72C01}"/>
-              </a:ext>
-            </a:extLst>
-          </p:cNvPr>
-          <p:cNvPicPr>
-            <a:picLocks noChangeAspect="1"/>
-          </p:cNvPicPr>
-          <p:nvPr/>
-        </p:nvPicPr>
-        <p:blipFill>
-          <a:blip r:embed="rId2"/>
-          <a:stretch>
-            <a:fillRect/>
-          </a:stretch>
-        </p:blipFill>
-        <p:spPr>
-          <a:xfrm>
-            <a:off x="239776" y="-303427"/>
-            <a:ext cx="9267825" cy="6810375"/>
-          </a:xfrm>
-          <a:prstGeom prst="rect">
-            <a:avLst/>
-          </a:prstGeom>
-        </p:spPr>
-      </p:pic>
-      <p:sp>
-        <p:nvSpPr>
-          <p:cNvPr id="6" name="TextBox 5">
-            <a:extLst>
-              <a:ext uri="{FF2B5EF4-FFF2-40B4-BE49-F238E27FC236}">
-                <a16:creationId xmlns:a16="http://schemas.microsoft.com/office/drawing/2014/main" id="{BDFDEE01-94A5-40CF-8090-14BEE6C3DD88}"/>
-              </a:ext>
-            </a:extLst>
-          </p:cNvPr>
-          <p:cNvSpPr txBox="1"/>
-          <p:nvPr/>
-        </p:nvSpPr>
-        <p:spPr>
-          <a:xfrm>
-            <a:off x="71021" y="6506948"/>
-            <a:ext cx="6853561" cy="300082"/>
-          </a:xfrm>
-          <a:prstGeom prst="rect">
-            <a:avLst/>
-          </a:prstGeom>
-          <a:noFill/>
-        </p:spPr>
-        <p:txBody>
-          <a:bodyPr wrap="square" rtlCol="0">
-            <a:spAutoFit/>
-          </a:bodyPr>
-          <a:lstStyle/>
-          <a:p>
-            <a:pPr algn="l"/>
-            <a:r>
-              <a:rPr lang="en-US" sz="1350" b="0" dirty="0">
-                <a:solidFill>
-                  <a:srgbClr val="333333"/>
-                </a:solidFill>
-                <a:effectLst/>
-                <a:latin typeface="Arial" panose="020B0604020202020204" pitchFamily="34" charset="0"/>
-                <a:cs typeface="Arial" panose="020B0604020202020204" pitchFamily="34" charset="0"/>
-              </a:rPr>
-              <a:t>Biecek P. &amp; Burzykowski T. (2020). </a:t>
-            </a:r>
-            <a:r>
-              <a:rPr lang="en-US" sz="1350" i="1" dirty="0">
-                <a:solidFill>
-                  <a:srgbClr val="333333"/>
-                </a:solidFill>
-                <a:effectLst/>
-                <a:latin typeface="Arial" panose="020B0604020202020204" pitchFamily="34" charset="0"/>
-                <a:cs typeface="Arial" panose="020B0604020202020204" pitchFamily="34" charset="0"/>
-              </a:rPr>
-              <a:t>Explanatory Model Analysis</a:t>
-            </a:r>
-            <a:r>
-              <a:rPr lang="en-US" sz="1350" i="1" dirty="0">
-                <a:solidFill>
-                  <a:srgbClr val="333333"/>
-                </a:solidFill>
-                <a:latin typeface="Arial" panose="020B0604020202020204" pitchFamily="34" charset="0"/>
-                <a:cs typeface="Arial" panose="020B0604020202020204" pitchFamily="34" charset="0"/>
-              </a:rPr>
-              <a:t>.</a:t>
-            </a:r>
-            <a:r>
-              <a:rPr lang="en-US" sz="1350" b="0" i="1" dirty="0">
-                <a:solidFill>
-                  <a:srgbClr val="333333"/>
-                </a:solidFill>
-                <a:effectLst/>
-                <a:latin typeface="Arial" panose="020B0604020202020204" pitchFamily="34" charset="0"/>
-                <a:cs typeface="Arial" panose="020B0604020202020204" pitchFamily="34" charset="0"/>
-              </a:rPr>
-              <a:t> </a:t>
-            </a:r>
-            <a:r>
-              <a:rPr lang="en-US" sz="1350" b="0" i="1" dirty="0">
-                <a:solidFill>
-                  <a:srgbClr val="333333"/>
-                </a:solidFill>
-                <a:effectLst/>
-                <a:latin typeface="Arial" panose="020B0604020202020204" pitchFamily="34" charset="0"/>
-                <a:cs typeface="Arial" panose="020B0604020202020204" pitchFamily="34" charset="0"/>
-                <a:hlinkClick r:id="rId3"/>
-              </a:rPr>
-              <a:t>http://ema.drwhy.ai/</a:t>
-            </a:r>
-            <a:r>
-              <a:rPr lang="en-US" sz="1350" b="0" i="1" dirty="0">
-                <a:solidFill>
-                  <a:srgbClr val="333333"/>
-                </a:solidFill>
-                <a:effectLst/>
-                <a:latin typeface="Arial" panose="020B0604020202020204" pitchFamily="34" charset="0"/>
-                <a:cs typeface="Arial" panose="020B0604020202020204" pitchFamily="34" charset="0"/>
-              </a:rPr>
-              <a:t> </a:t>
-            </a:r>
-            <a:endParaRPr lang="en-US" sz="1350" b="0" i="0" dirty="0">
-              <a:solidFill>
-                <a:srgbClr val="333333"/>
-              </a:solidFill>
-              <a:effectLst/>
-              <a:latin typeface="Arial" panose="020B0604020202020204" pitchFamily="34" charset="0"/>
-              <a:cs typeface="Arial" panose="020B0604020202020204" pitchFamily="34" charset="0"/>
-            </a:endParaRPr>
-          </a:p>
-        </p:txBody>
-      </p:sp>
-    </p:spTree>
-    <p:extLst>
-      <p:ext uri="{BB962C8B-B14F-4D97-AF65-F5344CB8AC3E}">
-        <p14:creationId xmlns:p14="http://schemas.microsoft.com/office/powerpoint/2010/main" val="2636067506"/>
       </p:ext>
     </p:extLst>
   </p:cSld>

</xml_diff>

<commit_message>
dir cleanup, Readme, Vignette
</commit_message>
<xml_diff>
--- a/zDesignDrafts/Trees_of_Cheem_pitch.pptx
+++ b/zDesignDrafts/Trees_of_Cheem_pitch.pptx
@@ -212,7 +212,7 @@
           <a:p>
             <a:fld id="{C72F94A2-838B-4759-A66F-F5175F9F634D}" type="datetimeFigureOut">
               <a:rPr lang="en-US" smtClean="0"/>
-              <a:t>27-Apr-21</a:t>
+              <a:t>28-Apr-21</a:t>
             </a:fld>
             <a:endParaRPr lang="en-US"/>
           </a:p>
@@ -626,7 +626,7 @@
           <a:p>
             <a:fld id="{DF9E133C-D775-44AC-B629-43372F2DE94E}" type="datetimeFigureOut">
               <a:rPr lang="en-US" smtClean="0"/>
-              <a:t>27-Apr-21</a:t>
+              <a:t>28-Apr-21</a:t>
             </a:fld>
             <a:endParaRPr lang="en-US"/>
           </a:p>
@@ -824,7 +824,7 @@
           <a:p>
             <a:fld id="{DF9E133C-D775-44AC-B629-43372F2DE94E}" type="datetimeFigureOut">
               <a:rPr lang="en-US" smtClean="0"/>
-              <a:t>27-Apr-21</a:t>
+              <a:t>28-Apr-21</a:t>
             </a:fld>
             <a:endParaRPr lang="en-US"/>
           </a:p>
@@ -1032,7 +1032,7 @@
           <a:p>
             <a:fld id="{DF9E133C-D775-44AC-B629-43372F2DE94E}" type="datetimeFigureOut">
               <a:rPr lang="en-US" smtClean="0"/>
-              <a:t>27-Apr-21</a:t>
+              <a:t>28-Apr-21</a:t>
             </a:fld>
             <a:endParaRPr lang="en-US"/>
           </a:p>
@@ -1230,7 +1230,7 @@
           <a:p>
             <a:fld id="{DF9E133C-D775-44AC-B629-43372F2DE94E}" type="datetimeFigureOut">
               <a:rPr lang="en-US" smtClean="0"/>
-              <a:t>27-Apr-21</a:t>
+              <a:t>28-Apr-21</a:t>
             </a:fld>
             <a:endParaRPr lang="en-US"/>
           </a:p>
@@ -1505,7 +1505,7 @@
           <a:p>
             <a:fld id="{DF9E133C-D775-44AC-B629-43372F2DE94E}" type="datetimeFigureOut">
               <a:rPr lang="en-US" smtClean="0"/>
-              <a:t>27-Apr-21</a:t>
+              <a:t>28-Apr-21</a:t>
             </a:fld>
             <a:endParaRPr lang="en-US"/>
           </a:p>
@@ -1770,7 +1770,7 @@
           <a:p>
             <a:fld id="{DF9E133C-D775-44AC-B629-43372F2DE94E}" type="datetimeFigureOut">
               <a:rPr lang="en-US" smtClean="0"/>
-              <a:t>27-Apr-21</a:t>
+              <a:t>28-Apr-21</a:t>
             </a:fld>
             <a:endParaRPr lang="en-US"/>
           </a:p>
@@ -2182,7 +2182,7 @@
           <a:p>
             <a:fld id="{DF9E133C-D775-44AC-B629-43372F2DE94E}" type="datetimeFigureOut">
               <a:rPr lang="en-US" smtClean="0"/>
-              <a:t>27-Apr-21</a:t>
+              <a:t>28-Apr-21</a:t>
             </a:fld>
             <a:endParaRPr lang="en-US"/>
           </a:p>
@@ -2323,7 +2323,7 @@
           <a:p>
             <a:fld id="{DF9E133C-D775-44AC-B629-43372F2DE94E}" type="datetimeFigureOut">
               <a:rPr lang="en-US" smtClean="0"/>
-              <a:t>27-Apr-21</a:t>
+              <a:t>28-Apr-21</a:t>
             </a:fld>
             <a:endParaRPr lang="en-US"/>
           </a:p>
@@ -2436,7 +2436,7 @@
           <a:p>
             <a:fld id="{DF9E133C-D775-44AC-B629-43372F2DE94E}" type="datetimeFigureOut">
               <a:rPr lang="en-US" smtClean="0"/>
-              <a:t>27-Apr-21</a:t>
+              <a:t>28-Apr-21</a:t>
             </a:fld>
             <a:endParaRPr lang="en-US"/>
           </a:p>
@@ -2747,7 +2747,7 @@
           <a:p>
             <a:fld id="{DF9E133C-D775-44AC-B629-43372F2DE94E}" type="datetimeFigureOut">
               <a:rPr lang="en-US" smtClean="0"/>
-              <a:t>27-Apr-21</a:t>
+              <a:t>28-Apr-21</a:t>
             </a:fld>
             <a:endParaRPr lang="en-US"/>
           </a:p>
@@ -3035,7 +3035,7 @@
           <a:p>
             <a:fld id="{DF9E133C-D775-44AC-B629-43372F2DE94E}" type="datetimeFigureOut">
               <a:rPr lang="en-US" smtClean="0"/>
-              <a:t>27-Apr-21</a:t>
+              <a:t>28-Apr-21</a:t>
             </a:fld>
             <a:endParaRPr lang="en-US"/>
           </a:p>
@@ -3276,7 +3276,7 @@
           <a:p>
             <a:fld id="{DF9E133C-D775-44AC-B629-43372F2DE94E}" type="datetimeFigureOut">
               <a:rPr lang="en-US" smtClean="0"/>
-              <a:t>27-Apr-21</a:t>
+              <a:t>28-Apr-21</a:t>
             </a:fld>
             <a:endParaRPr lang="en-US"/>
           </a:p>
@@ -3856,8 +3856,8 @@
         </p:blipFill>
         <p:spPr>
           <a:xfrm>
-            <a:off x="7510108" y="706056"/>
-            <a:ext cx="695304" cy="802760"/>
+            <a:off x="7590110" y="716506"/>
+            <a:ext cx="456780" cy="527374"/>
           </a:xfrm>
           <a:prstGeom prst="rect">
             <a:avLst/>
@@ -3893,7 +3893,7 @@
         </p:blipFill>
         <p:spPr bwMode="auto">
           <a:xfrm>
-            <a:off x="4722471" y="1514475"/>
+            <a:off x="4675816" y="1253212"/>
             <a:ext cx="3333750" cy="1914525"/>
           </a:xfrm>
           <a:prstGeom prst="rect">
@@ -3925,8 +3925,8 @@
         </p:nvSpPr>
         <p:spPr>
           <a:xfrm>
-            <a:off x="4634398" y="3523706"/>
-            <a:ext cx="4717317" cy="923330"/>
+            <a:off x="4634398" y="3215789"/>
+            <a:ext cx="3203121" cy="646331"/>
           </a:xfrm>
           <a:prstGeom prst="rect">
             <a:avLst/>
@@ -3940,22 +3940,22 @@
           <a:lstStyle/>
           <a:p>
             <a:r>
-              <a:rPr lang="en-US" dirty="0">
+              <a:rPr lang="en-US" sz="1200" dirty="0">
                 <a:hlinkClick r:id="rId4"/>
               </a:rPr>
               <a:t>https://tardis.fandom.com/wiki/Tree_of_Cheem</a:t>
             </a:r>
-            <a:endParaRPr lang="en-US" dirty="0"/>
-          </a:p>
-          <a:p>
-            <a:r>
-              <a:rPr lang="en-US" dirty="0"/>
+            <a:endParaRPr lang="en-US" sz="1200" dirty="0"/>
+          </a:p>
+          <a:p>
+            <a:r>
+              <a:rPr lang="en-US" sz="1200" dirty="0"/>
               <a:t>Dr. Who, Series 1, </a:t>
             </a:r>
           </a:p>
           <a:p>
             <a:r>
-              <a:rPr lang="en-US" dirty="0"/>
+              <a:rPr lang="en-US" sz="1200" dirty="0"/>
               <a:t>Episode 2, The End of the World</a:t>
             </a:r>
           </a:p>
@@ -6035,8 +6035,8 @@
         </p:nvSpPr>
         <p:spPr>
           <a:xfrm>
-            <a:off x="1012661" y="6142419"/>
-            <a:ext cx="7335841" cy="715581"/>
+            <a:off x="580736" y="6195286"/>
+            <a:ext cx="7335841" cy="600164"/>
           </a:xfrm>
           <a:prstGeom prst="rect">
             <a:avLst/>
@@ -6051,7 +6051,7 @@
           <a:p>
             <a:pPr algn="l"/>
             <a:r>
-              <a:rPr lang="en-US" sz="1350" b="0" i="0" dirty="0">
+              <a:rPr lang="en-US" sz="1100" b="0" i="0" dirty="0">
                 <a:solidFill>
                   <a:srgbClr val="222222"/>
                 </a:solidFill>
@@ -6061,7 +6061,7 @@
               <a:t>(top) Wickham, H., &amp; Grolemund, G. (2016). </a:t>
             </a:r>
             <a:r>
-              <a:rPr lang="en-US" sz="1350" b="0" i="1" dirty="0">
+              <a:rPr lang="en-US" sz="1100" b="0" i="1" dirty="0">
                 <a:solidFill>
                   <a:srgbClr val="222222"/>
                 </a:solidFill>
@@ -6071,7 +6071,7 @@
               <a:t>R for data science. </a:t>
             </a:r>
             <a:r>
-              <a:rPr lang="en-US" sz="1350" b="0" i="1" dirty="0">
+              <a:rPr lang="en-US" sz="1100" b="0" i="1" dirty="0">
                 <a:solidFill>
                   <a:srgbClr val="222222"/>
                 </a:solidFill>
@@ -6081,7 +6081,7 @@
               </a:rPr>
               <a:t>https://r4ds.had.co.nz/</a:t>
             </a:r>
-            <a:endParaRPr lang="en-US" sz="1350" b="0" i="1" dirty="0">
+            <a:endParaRPr lang="en-US" sz="1100" b="0" i="1" dirty="0">
               <a:solidFill>
                 <a:srgbClr val="222222"/>
               </a:solidFill>
@@ -6091,7 +6091,7 @@
           </a:p>
           <a:p>
             <a:r>
-              <a:rPr lang="en-US" sz="1350" b="0" dirty="0">
+              <a:rPr lang="en-US" sz="1100" b="0" dirty="0">
                 <a:solidFill>
                   <a:srgbClr val="333333"/>
                 </a:solidFill>
@@ -6102,7 +6102,7 @@
               <a:t>(bottom) Biecek P. &amp; Burzykowski T. (2020). </a:t>
             </a:r>
             <a:r>
-              <a:rPr lang="en-US" sz="1350" i="1" dirty="0">
+              <a:rPr lang="en-US" sz="1100" i="1" dirty="0">
                 <a:solidFill>
                   <a:srgbClr val="333333"/>
                 </a:solidFill>
@@ -6113,7 +6113,7 @@
               <a:t>Explanatory Model Analysis</a:t>
             </a:r>
             <a:r>
-              <a:rPr lang="en-US" sz="1350" i="1" dirty="0">
+              <a:rPr lang="en-US" sz="1100" i="1" dirty="0">
                 <a:solidFill>
                   <a:srgbClr val="333333"/>
                 </a:solidFill>
@@ -6123,7 +6123,7 @@
               <a:t>.</a:t>
             </a:r>
             <a:r>
-              <a:rPr lang="en-US" sz="1350" b="0" i="1" dirty="0">
+              <a:rPr lang="en-US" sz="1100" b="0" i="1" dirty="0">
                 <a:solidFill>
                   <a:srgbClr val="333333"/>
                 </a:solidFill>
@@ -6134,7 +6134,7 @@
               <a:t> </a:t>
             </a:r>
             <a:r>
-              <a:rPr lang="en-US" sz="1350" b="0" i="1" dirty="0">
+              <a:rPr lang="en-US" sz="1100" b="0" i="1" dirty="0">
                 <a:solidFill>
                   <a:srgbClr val="333333"/>
                 </a:solidFill>
@@ -6145,7 +6145,7 @@
               </a:rPr>
               <a:t>http://ema.drwhy.ai/</a:t>
             </a:r>
-            <a:endParaRPr lang="en-US" sz="1350" b="0" i="0" dirty="0">
+            <a:endParaRPr lang="en-US" sz="1100" b="0" i="0" dirty="0">
               <a:solidFill>
                 <a:srgbClr val="333333"/>
               </a:solidFill>
@@ -6157,7 +6157,7 @@
           <a:p>
             <a:pPr algn="l"/>
             <a:r>
-              <a:rPr lang="en-US" sz="1350" dirty="0">
+              <a:rPr lang="en-US" sz="1100" dirty="0">
                 <a:latin typeface="Arial" panose="020B0604020202020204" pitchFamily="34" charset="0"/>
                 <a:cs typeface="Arial" panose="020B0604020202020204" pitchFamily="34" charset="0"/>
               </a:rPr>

</xml_diff>